<commit_message>
poster draft, needs specificities
</commit_message>
<xml_diff>
--- a/poster/poster.pptx
+++ b/poster/poster.pptx
@@ -288,7 +288,7 @@
           <a:p>
             <a:fld id="{24E72DE2-AD54-445F-BDF3-6E766A2209E8}" type="datetimeFigureOut">
               <a:rPr lang="en-US" smtClean="0"/>
-              <a:t>12/3/2013</a:t>
+              <a:t>12/4/2013</a:t>
             </a:fld>
             <a:endParaRPr lang="en-US"/>
           </a:p>
@@ -458,7 +458,7 @@
           <a:p>
             <a:fld id="{24E72DE2-AD54-445F-BDF3-6E766A2209E8}" type="datetimeFigureOut">
               <a:rPr lang="en-US" smtClean="0"/>
-              <a:t>12/3/2013</a:t>
+              <a:t>12/4/2013</a:t>
             </a:fld>
             <a:endParaRPr lang="en-US"/>
           </a:p>
@@ -638,7 +638,7 @@
           <a:p>
             <a:fld id="{24E72DE2-AD54-445F-BDF3-6E766A2209E8}" type="datetimeFigureOut">
               <a:rPr lang="en-US" smtClean="0"/>
-              <a:t>12/3/2013</a:t>
+              <a:t>12/4/2013</a:t>
             </a:fld>
             <a:endParaRPr lang="en-US"/>
           </a:p>
@@ -808,7 +808,7 @@
           <a:p>
             <a:fld id="{24E72DE2-AD54-445F-BDF3-6E766A2209E8}" type="datetimeFigureOut">
               <a:rPr lang="en-US" smtClean="0"/>
-              <a:t>12/3/2013</a:t>
+              <a:t>12/4/2013</a:t>
             </a:fld>
             <a:endParaRPr lang="en-US"/>
           </a:p>
@@ -1054,7 +1054,7 @@
           <a:p>
             <a:fld id="{24E72DE2-AD54-445F-BDF3-6E766A2209E8}" type="datetimeFigureOut">
               <a:rPr lang="en-US" smtClean="0"/>
-              <a:t>12/3/2013</a:t>
+              <a:t>12/4/2013</a:t>
             </a:fld>
             <a:endParaRPr lang="en-US"/>
           </a:p>
@@ -1342,7 +1342,7 @@
           <a:p>
             <a:fld id="{24E72DE2-AD54-445F-BDF3-6E766A2209E8}" type="datetimeFigureOut">
               <a:rPr lang="en-US" smtClean="0"/>
-              <a:t>12/3/2013</a:t>
+              <a:t>12/4/2013</a:t>
             </a:fld>
             <a:endParaRPr lang="en-US"/>
           </a:p>
@@ -1769,7 +1769,7 @@
           <a:p>
             <a:fld id="{24E72DE2-AD54-445F-BDF3-6E766A2209E8}" type="datetimeFigureOut">
               <a:rPr lang="en-US" smtClean="0"/>
-              <a:t>12/3/2013</a:t>
+              <a:t>12/4/2013</a:t>
             </a:fld>
             <a:endParaRPr lang="en-US"/>
           </a:p>
@@ -1887,7 +1887,7 @@
           <a:p>
             <a:fld id="{24E72DE2-AD54-445F-BDF3-6E766A2209E8}" type="datetimeFigureOut">
               <a:rPr lang="en-US" smtClean="0"/>
-              <a:t>12/3/2013</a:t>
+              <a:t>12/4/2013</a:t>
             </a:fld>
             <a:endParaRPr lang="en-US"/>
           </a:p>
@@ -1982,7 +1982,7 @@
           <a:p>
             <a:fld id="{24E72DE2-AD54-445F-BDF3-6E766A2209E8}" type="datetimeFigureOut">
               <a:rPr lang="en-US" smtClean="0"/>
-              <a:t>12/3/2013</a:t>
+              <a:t>12/4/2013</a:t>
             </a:fld>
             <a:endParaRPr lang="en-US"/>
           </a:p>
@@ -2259,7 +2259,7 @@
           <a:p>
             <a:fld id="{24E72DE2-AD54-445F-BDF3-6E766A2209E8}" type="datetimeFigureOut">
               <a:rPr lang="en-US" smtClean="0"/>
-              <a:t>12/3/2013</a:t>
+              <a:t>12/4/2013</a:t>
             </a:fld>
             <a:endParaRPr lang="en-US"/>
           </a:p>
@@ -2512,7 +2512,7 @@
           <a:p>
             <a:fld id="{24E72DE2-AD54-445F-BDF3-6E766A2209E8}" type="datetimeFigureOut">
               <a:rPr lang="en-US" smtClean="0"/>
-              <a:t>12/3/2013</a:t>
+              <a:t>12/4/2013</a:t>
             </a:fld>
             <a:endParaRPr lang="en-US"/>
           </a:p>
@@ -2725,7 +2725,7 @@
           <a:p>
             <a:fld id="{24E72DE2-AD54-445F-BDF3-6E766A2209E8}" type="datetimeFigureOut">
               <a:rPr lang="en-US" smtClean="0"/>
-              <a:t>12/3/2013</a:t>
+              <a:t>12/4/2013</a:t>
             </a:fld>
             <a:endParaRPr lang="en-US"/>
           </a:p>
@@ -3365,7 +3365,7 @@
         </p:nvSpPr>
         <p:spPr>
           <a:xfrm>
-            <a:off x="914400" y="22860000"/>
+            <a:off x="914400" y="26517600"/>
             <a:ext cx="31089600" cy="1828800"/>
           </a:xfrm>
           <a:prstGeom prst="roundRect">
@@ -3428,7 +3428,7 @@
         <p:spPr>
           <a:xfrm>
             <a:off x="914400" y="9144000"/>
-            <a:ext cx="14630400" cy="12801600"/>
+            <a:ext cx="14630400" cy="16459200"/>
           </a:xfrm>
           <a:prstGeom prst="rect">
             <a:avLst/>
@@ -3459,7 +3459,7 @@
           <a:lstStyle/>
           <a:p>
             <a:pPr algn="ctr"/>
-            <a:endParaRPr lang="en-US"/>
+            <a:endParaRPr lang="en-US" sz="4500" dirty="0"/>
           </a:p>
         </p:txBody>
       </p:sp>
@@ -3472,7 +3472,7 @@
         <p:spPr>
           <a:xfrm>
             <a:off x="17373600" y="9144000"/>
-            <a:ext cx="14630400" cy="12801600"/>
+            <a:ext cx="14630400" cy="16459200"/>
           </a:xfrm>
           <a:prstGeom prst="rect">
             <a:avLst/>
@@ -3515,8 +3515,8 @@
         </p:nvSpPr>
         <p:spPr>
           <a:xfrm>
-            <a:off x="914400" y="25603200"/>
-            <a:ext cx="31089600" cy="15544800"/>
+            <a:off x="14630400" y="29260800"/>
+            <a:ext cx="17373600" cy="11887200"/>
           </a:xfrm>
           <a:prstGeom prst="rect">
             <a:avLst/>
@@ -3547,7 +3547,7 @@
           <a:lstStyle/>
           <a:p>
             <a:pPr algn="ctr"/>
-            <a:endParaRPr lang="en-US"/>
+            <a:endParaRPr lang="en-US" dirty="0"/>
           </a:p>
         </p:txBody>
       </p:sp>
@@ -3605,6 +3605,1606 @@
           </a:extLst>
         </p:spPr>
       </p:pic>
+      <p:sp>
+        <p:nvSpPr>
+          <p:cNvPr id="2" name="TextBox 1"/>
+          <p:cNvSpPr txBox="1"/>
+          <p:nvPr/>
+        </p:nvSpPr>
+        <p:spPr>
+          <a:xfrm>
+            <a:off x="914400" y="9144000"/>
+            <a:ext cx="14630400" cy="9941183"/>
+          </a:xfrm>
+          <a:prstGeom prst="rect">
+            <a:avLst/>
+          </a:prstGeom>
+          <a:noFill/>
+        </p:spPr>
+        <p:txBody>
+          <a:bodyPr wrap="square" rtlCol="0">
+            <a:spAutoFit/>
+          </a:bodyPr>
+          <a:lstStyle/>
+          <a:p>
+            <a:r>
+              <a:rPr lang="en-US" sz="4000" dirty="0" smtClean="0">
+                <a:latin typeface="Arial" panose="020B0604020202020204" pitchFamily="34" charset="0"/>
+                <a:cs typeface="Arial" panose="020B0604020202020204" pitchFamily="34" charset="0"/>
+              </a:rPr>
+              <a:t>      In the modern day, airplanes are a frequently-used means of transportation. However, due to many different factors, such as weather, restricted areas, and </a:t>
+            </a:r>
+            <a:r>
+              <a:rPr lang="en-US" sz="4000" dirty="0" err="1" smtClean="0">
+                <a:latin typeface="Arial" panose="020B0604020202020204" pitchFamily="34" charset="0"/>
+                <a:cs typeface="Arial" panose="020B0604020202020204" pitchFamily="34" charset="0"/>
+              </a:rPr>
+              <a:t>jetstreams</a:t>
+            </a:r>
+            <a:r>
+              <a:rPr lang="en-US" sz="4000" dirty="0" smtClean="0">
+                <a:latin typeface="Arial" panose="020B0604020202020204" pitchFamily="34" charset="0"/>
+                <a:cs typeface="Arial" panose="020B0604020202020204" pitchFamily="34" charset="0"/>
+              </a:rPr>
+              <a:t>, it’s very difficult to keep the cost of such transportation at an optimal level. What we aim to do here in Flight Quest is to optimize to the best of our ability the costs of airplane flights using machine learning techniques.</a:t>
+            </a:r>
+          </a:p>
+          <a:p>
+            <a:r>
+              <a:rPr lang="en-US" sz="4000" dirty="0" smtClean="0">
+                <a:latin typeface="Arial" panose="020B0604020202020204" pitchFamily="34" charset="0"/>
+                <a:cs typeface="Arial" panose="020B0604020202020204" pitchFamily="34" charset="0"/>
+              </a:rPr>
+              <a:t>     </a:t>
+            </a:r>
+          </a:p>
+          <a:p>
+            <a:r>
+              <a:rPr lang="en-US" sz="4000" dirty="0">
+                <a:latin typeface="Arial" panose="020B0604020202020204" pitchFamily="34" charset="0"/>
+                <a:cs typeface="Arial" panose="020B0604020202020204" pitchFamily="34" charset="0"/>
+              </a:rPr>
+              <a:t> </a:t>
+            </a:r>
+            <a:r>
+              <a:rPr lang="en-US" sz="4000" dirty="0" smtClean="0">
+                <a:latin typeface="Arial" panose="020B0604020202020204" pitchFamily="34" charset="0"/>
+                <a:cs typeface="Arial" panose="020B0604020202020204" pitchFamily="34" charset="0"/>
+              </a:rPr>
+              <a:t>    Our task consists of using data obtained from previous flights to try and find optimal paths and conditions (e.g. speed, altitude) for new flights to take.</a:t>
+            </a:r>
+            <a:endParaRPr lang="en-US" sz="4000" dirty="0">
+              <a:latin typeface="Arial" panose="020B0604020202020204" pitchFamily="34" charset="0"/>
+              <a:cs typeface="Arial" panose="020B0604020202020204" pitchFamily="34" charset="0"/>
+            </a:endParaRPr>
+          </a:p>
+          <a:p>
+            <a:endParaRPr lang="en-US" sz="4000" dirty="0" smtClean="0">
+              <a:latin typeface="Arial" panose="020B0604020202020204" pitchFamily="34" charset="0"/>
+              <a:cs typeface="Arial" panose="020B0604020202020204" pitchFamily="34" charset="0"/>
+            </a:endParaRPr>
+          </a:p>
+          <a:p>
+            <a:r>
+              <a:rPr lang="en-US" sz="4000" dirty="0">
+                <a:latin typeface="Arial" panose="020B0604020202020204" pitchFamily="34" charset="0"/>
+                <a:cs typeface="Arial" panose="020B0604020202020204" pitchFamily="34" charset="0"/>
+              </a:rPr>
+              <a:t> </a:t>
+            </a:r>
+            <a:r>
+              <a:rPr lang="en-US" sz="4000" dirty="0" smtClean="0">
+                <a:latin typeface="Arial" panose="020B0604020202020204" pitchFamily="34" charset="0"/>
+                <a:cs typeface="Arial" panose="020B0604020202020204" pitchFamily="34" charset="0"/>
+              </a:rPr>
+              <a:t>    Our motivation for undertaking this task came from searching for something that would both challenge us to use what we learned in innovative ways and would have an impact on people’s lives. </a:t>
+            </a:r>
+            <a:endParaRPr lang="en-US" sz="4000" dirty="0">
+              <a:latin typeface="Arial" panose="020B0604020202020204" pitchFamily="34" charset="0"/>
+              <a:cs typeface="Arial" panose="020B0604020202020204" pitchFamily="34" charset="0"/>
+            </a:endParaRPr>
+          </a:p>
+        </p:txBody>
+      </p:sp>
+      <p:sp>
+        <p:nvSpPr>
+          <p:cNvPr id="14" name="TextBox 13"/>
+          <p:cNvSpPr txBox="1"/>
+          <p:nvPr/>
+        </p:nvSpPr>
+        <p:spPr>
+          <a:xfrm>
+            <a:off x="17373600" y="9144000"/>
+            <a:ext cx="14630400" cy="10064294"/>
+          </a:xfrm>
+          <a:prstGeom prst="rect">
+            <a:avLst/>
+          </a:prstGeom>
+          <a:noFill/>
+        </p:spPr>
+        <p:txBody>
+          <a:bodyPr wrap="square" rtlCol="0">
+            <a:spAutoFit/>
+          </a:bodyPr>
+          <a:lstStyle/>
+          <a:p>
+            <a:r>
+              <a:rPr lang="en-US" sz="3600" dirty="0" smtClean="0">
+                <a:latin typeface="Arial" panose="020B0604020202020204" pitchFamily="34" charset="0"/>
+                <a:cs typeface="Arial" panose="020B0604020202020204" pitchFamily="34" charset="0"/>
+              </a:rPr>
+              <a:t>      First, we created a baseline measure that took the most direct distance in between the current and destination points (via great circle calculation) and made that the desired path. </a:t>
+            </a:r>
+          </a:p>
+          <a:p>
+            <a:endParaRPr lang="en-US" sz="3600" dirty="0">
+              <a:latin typeface="Arial" panose="020B0604020202020204" pitchFamily="34" charset="0"/>
+              <a:cs typeface="Arial" panose="020B0604020202020204" pitchFamily="34" charset="0"/>
+            </a:endParaRPr>
+          </a:p>
+          <a:p>
+            <a:r>
+              <a:rPr lang="en-US" sz="3600" dirty="0" smtClean="0">
+                <a:latin typeface="Arial" panose="020B0604020202020204" pitchFamily="34" charset="0"/>
+                <a:cs typeface="Arial" panose="020B0604020202020204" pitchFamily="34" charset="0"/>
+              </a:rPr>
+              <a:t>	Our next step was to identify and work out a path 	around restricted areas, since no flights can pass 	through these areas lest they be shot down. In 	order to account for this, we consider numerous 	points in between our current and destination 	locations and then attempt to construct a path 	going through points that don’t lie in restricted 	areas using an A* search (as shown on left).</a:t>
+            </a:r>
+          </a:p>
+          <a:p>
+            <a:endParaRPr lang="en-US" sz="3600" dirty="0">
+              <a:latin typeface="Arial" panose="020B0604020202020204" pitchFamily="34" charset="0"/>
+              <a:cs typeface="Arial" panose="020B0604020202020204" pitchFamily="34" charset="0"/>
+            </a:endParaRPr>
+          </a:p>
+          <a:p>
+            <a:r>
+              <a:rPr lang="en-US" sz="3600" dirty="0" smtClean="0">
+                <a:latin typeface="Arial" panose="020B0604020202020204" pitchFamily="34" charset="0"/>
+                <a:cs typeface="Arial" panose="020B0604020202020204" pitchFamily="34" charset="0"/>
+              </a:rPr>
+              <a:t>     Afterwards, we focused on finding optimal speeds and altitudes for segments of the flight path in order to find the best balance between fuel consumption and arrival time. In order to do this, we would need to first find the features that would be significant enough to train on and then train our data using a regression model.</a:t>
+            </a:r>
+            <a:endParaRPr lang="en-US" sz="3600" dirty="0">
+              <a:latin typeface="Arial" panose="020B0604020202020204" pitchFamily="34" charset="0"/>
+              <a:cs typeface="Arial" panose="020B0604020202020204" pitchFamily="34" charset="0"/>
+            </a:endParaRPr>
+          </a:p>
+        </p:txBody>
+      </p:sp>
+      <p:pic>
+        <p:nvPicPr>
+          <p:cNvPr id="1027" name="Picture 3"/>
+          <p:cNvPicPr>
+            <a:picLocks noChangeAspect="1" noChangeArrowheads="1"/>
+          </p:cNvPicPr>
+          <p:nvPr/>
+        </p:nvPicPr>
+        <p:blipFill>
+          <a:blip r:embed="rId4">
+            <a:extLst>
+              <a:ext uri="{28A0092B-C50C-407E-A947-70E740481C1C}">
+                <a14:useLocalDpi xmlns:a14="http://schemas.microsoft.com/office/drawing/2010/main" val="0"/>
+              </a:ext>
+            </a:extLst>
+          </a:blip>
+          <a:srcRect/>
+          <a:stretch>
+            <a:fillRect/>
+          </a:stretch>
+        </p:blipFill>
+        <p:spPr bwMode="auto">
+          <a:xfrm>
+            <a:off x="17573625" y="11144251"/>
+            <a:ext cx="3857625" cy="4800599"/>
+          </a:xfrm>
+          <a:prstGeom prst="rect">
+            <a:avLst/>
+          </a:prstGeom>
+          <a:noFill/>
+          <a:ln>
+            <a:noFill/>
+          </a:ln>
+          <a:extLst>
+            <a:ext uri="{909E8E84-426E-40DD-AFC4-6F175D3DCCD1}">
+              <a14:hiddenFill xmlns:a14="http://schemas.microsoft.com/office/drawing/2010/main">
+                <a:solidFill>
+                  <a:schemeClr val="accent1"/>
+                </a:solidFill>
+              </a14:hiddenFill>
+            </a:ext>
+            <a:ext uri="{91240B29-F687-4F45-9708-019B960494DF}">
+              <a14:hiddenLine xmlns:a14="http://schemas.microsoft.com/office/drawing/2010/main" w="9525">
+                <a:solidFill>
+                  <a:schemeClr val="tx1"/>
+                </a:solidFill>
+                <a:miter lim="800000"/>
+                <a:headEnd/>
+                <a:tailEnd/>
+              </a14:hiddenLine>
+            </a:ext>
+          </a:extLst>
+        </p:spPr>
+      </p:pic>
+      <p:sp>
+        <p:nvSpPr>
+          <p:cNvPr id="4" name="TextBox 3"/>
+          <p:cNvSpPr txBox="1"/>
+          <p:nvPr/>
+        </p:nvSpPr>
+        <p:spPr>
+          <a:xfrm>
+            <a:off x="914400" y="29260800"/>
+            <a:ext cx="31089600" cy="646331"/>
+          </a:xfrm>
+          <a:prstGeom prst="rect">
+            <a:avLst/>
+          </a:prstGeom>
+          <a:noFill/>
+        </p:spPr>
+        <p:txBody>
+          <a:bodyPr wrap="square" rtlCol="0">
+            <a:spAutoFit/>
+          </a:bodyPr>
+          <a:lstStyle/>
+          <a:p>
+            <a:r>
+              <a:rPr lang="en-US" sz="3600" dirty="0" smtClean="0"/>
+              <a:t>     </a:t>
+            </a:r>
+            <a:endParaRPr lang="en-US" sz="3600" dirty="0"/>
+          </a:p>
+        </p:txBody>
+      </p:sp>
+      <p:graphicFrame>
+        <p:nvGraphicFramePr>
+          <p:cNvPr id="5" name="Table 4"/>
+          <p:cNvGraphicFramePr>
+            <a:graphicFrameLocks noGrp="1"/>
+          </p:cNvGraphicFramePr>
+          <p:nvPr>
+            <p:extLst>
+              <p:ext uri="{D42A27DB-BD31-4B8C-83A1-F6EECF244321}">
+                <p14:modId xmlns:p14="http://schemas.microsoft.com/office/powerpoint/2010/main" val="542667089"/>
+              </p:ext>
+            </p:extLst>
+          </p:nvPr>
+        </p:nvGraphicFramePr>
+        <p:xfrm>
+          <a:off x="914400" y="29260800"/>
+          <a:ext cx="12801600" cy="11887197"/>
+        </p:xfrm>
+        <a:graphic>
+          <a:graphicData uri="http://schemas.openxmlformats.org/drawingml/2006/table">
+            <a:tbl>
+              <a:tblPr firstRow="1" bandRow="1">
+                <a:tableStyleId>{2A488322-F2BA-4B5B-9748-0D474271808F}</a:tableStyleId>
+              </a:tblPr>
+              <a:tblGrid>
+                <a:gridCol w="4572000"/>
+                <a:gridCol w="4572000"/>
+                <a:gridCol w="3657600"/>
+              </a:tblGrid>
+              <a:tr h="874059">
+                <a:tc>
+                  <a:txBody>
+                    <a:bodyPr/>
+                    <a:lstStyle/>
+                    <a:p>
+                      <a:pPr algn="ctr"/>
+                      <a:r>
+                        <a:rPr lang="en-US" sz="4400" b="1" dirty="0" smtClean="0">
+                          <a:solidFill>
+                            <a:schemeClr val="tx1"/>
+                          </a:solidFill>
+                        </a:rPr>
+                        <a:t>Method</a:t>
+                      </a:r>
+                      <a:endParaRPr lang="en-US" sz="4400" b="1" dirty="0">
+                        <a:solidFill>
+                          <a:schemeClr val="tx1"/>
+                        </a:solidFill>
+                      </a:endParaRPr>
+                    </a:p>
+                  </a:txBody>
+                  <a:tcPr>
+                    <a:lnL w="12700" cap="flat" cmpd="sng" algn="ctr">
+                      <a:noFill/>
+                      <a:prstDash val="solid"/>
+                      <a:round/>
+                      <a:headEnd type="none" w="med" len="med"/>
+                      <a:tailEnd type="none" w="med" len="med"/>
+                    </a:lnL>
+                    <a:lnR w="12700" cap="flat" cmpd="sng" algn="ctr">
+                      <a:noFill/>
+                      <a:prstDash val="solid"/>
+                      <a:round/>
+                      <a:headEnd type="none" w="med" len="med"/>
+                      <a:tailEnd type="none" w="med" len="med"/>
+                    </a:lnR>
+                    <a:lnT w="12700" cap="flat" cmpd="sng" algn="ctr">
+                      <a:noFill/>
+                      <a:prstDash val="solid"/>
+                      <a:round/>
+                      <a:headEnd type="none" w="med" len="med"/>
+                      <a:tailEnd type="none" w="med" len="med"/>
+                    </a:lnT>
+                    <a:lnB w="12700" cap="flat" cmpd="sng" algn="ctr">
+                      <a:noFill/>
+                      <a:prstDash val="solid"/>
+                      <a:round/>
+                      <a:headEnd type="none" w="med" len="med"/>
+                      <a:tailEnd type="none" w="med" len="med"/>
+                    </a:lnB>
+                  </a:tcPr>
+                </a:tc>
+                <a:tc>
+                  <a:txBody>
+                    <a:bodyPr/>
+                    <a:lstStyle/>
+                    <a:p>
+                      <a:pPr algn="ctr"/>
+                      <a:r>
+                        <a:rPr lang="en-US" sz="4400" b="1" dirty="0" smtClean="0">
+                          <a:solidFill>
+                            <a:schemeClr val="tx1"/>
+                          </a:solidFill>
+                        </a:rPr>
+                        <a:t>Features Used</a:t>
+                      </a:r>
+                      <a:endParaRPr lang="en-US" sz="4400" b="1" dirty="0">
+                        <a:solidFill>
+                          <a:schemeClr val="tx1"/>
+                        </a:solidFill>
+                      </a:endParaRPr>
+                    </a:p>
+                  </a:txBody>
+                  <a:tcPr>
+                    <a:lnL w="12700" cap="flat" cmpd="sng" algn="ctr">
+                      <a:noFill/>
+                      <a:prstDash val="solid"/>
+                      <a:round/>
+                      <a:headEnd type="none" w="med" len="med"/>
+                      <a:tailEnd type="none" w="med" len="med"/>
+                    </a:lnL>
+                    <a:lnR w="12700" cap="flat" cmpd="sng" algn="ctr">
+                      <a:noFill/>
+                      <a:prstDash val="solid"/>
+                      <a:round/>
+                      <a:headEnd type="none" w="med" len="med"/>
+                      <a:tailEnd type="none" w="med" len="med"/>
+                    </a:lnR>
+                    <a:lnT w="12700" cap="flat" cmpd="sng" algn="ctr">
+                      <a:noFill/>
+                      <a:prstDash val="solid"/>
+                      <a:round/>
+                      <a:headEnd type="none" w="med" len="med"/>
+                      <a:tailEnd type="none" w="med" len="med"/>
+                    </a:lnT>
+                    <a:lnB w="12700" cap="flat" cmpd="sng" algn="ctr">
+                      <a:noFill/>
+                      <a:prstDash val="solid"/>
+                      <a:round/>
+                      <a:headEnd type="none" w="med" len="med"/>
+                      <a:tailEnd type="none" w="med" len="med"/>
+                    </a:lnB>
+                  </a:tcPr>
+                </a:tc>
+                <a:tc>
+                  <a:txBody>
+                    <a:bodyPr/>
+                    <a:lstStyle/>
+                    <a:p>
+                      <a:pPr algn="ctr"/>
+                      <a:r>
+                        <a:rPr lang="en-US" sz="4400" b="1" dirty="0" smtClean="0">
+                          <a:solidFill>
+                            <a:schemeClr val="tx1"/>
+                          </a:solidFill>
+                        </a:rPr>
+                        <a:t>Cost</a:t>
+                      </a:r>
+                      <a:endParaRPr lang="en-US" sz="4400" b="1" dirty="0">
+                        <a:solidFill>
+                          <a:schemeClr val="tx1"/>
+                        </a:solidFill>
+                      </a:endParaRPr>
+                    </a:p>
+                  </a:txBody>
+                  <a:tcPr>
+                    <a:lnL w="12700" cap="flat" cmpd="sng" algn="ctr">
+                      <a:noFill/>
+                      <a:prstDash val="solid"/>
+                      <a:round/>
+                      <a:headEnd type="none" w="med" len="med"/>
+                      <a:tailEnd type="none" w="med" len="med"/>
+                    </a:lnL>
+                    <a:lnR w="12700" cap="flat" cmpd="sng" algn="ctr">
+                      <a:noFill/>
+                      <a:prstDash val="solid"/>
+                      <a:round/>
+                      <a:headEnd type="none" w="med" len="med"/>
+                      <a:tailEnd type="none" w="med" len="med"/>
+                    </a:lnR>
+                    <a:lnT w="12700" cap="flat" cmpd="sng" algn="ctr">
+                      <a:noFill/>
+                      <a:prstDash val="solid"/>
+                      <a:round/>
+                      <a:headEnd type="none" w="med" len="med"/>
+                      <a:tailEnd type="none" w="med" len="med"/>
+                    </a:lnT>
+                    <a:lnB w="12700" cap="flat" cmpd="sng" algn="ctr">
+                      <a:noFill/>
+                      <a:prstDash val="solid"/>
+                      <a:round/>
+                      <a:headEnd type="none" w="med" len="med"/>
+                      <a:tailEnd type="none" w="med" len="med"/>
+                    </a:lnB>
+                  </a:tcPr>
+                </a:tc>
+              </a:tr>
+              <a:tr h="1223682">
+                <a:tc>
+                  <a:txBody>
+                    <a:bodyPr/>
+                    <a:lstStyle/>
+                    <a:p>
+                      <a:pPr algn="ctr"/>
+                      <a:r>
+                        <a:rPr lang="en-US" sz="4400" b="1" dirty="0" smtClean="0"/>
+                        <a:t>Baseline</a:t>
+                      </a:r>
+                      <a:endParaRPr lang="en-US" sz="4400" b="1" dirty="0"/>
+                    </a:p>
+                  </a:txBody>
+                  <a:tcPr>
+                    <a:lnL w="12700" cap="flat" cmpd="sng" algn="ctr">
+                      <a:noFill/>
+                      <a:prstDash val="solid"/>
+                      <a:round/>
+                      <a:headEnd type="none" w="med" len="med"/>
+                      <a:tailEnd type="none" w="med" len="med"/>
+                    </a:lnL>
+                    <a:lnR w="12700" cap="flat" cmpd="sng" algn="ctr">
+                      <a:noFill/>
+                      <a:prstDash val="solid"/>
+                      <a:round/>
+                      <a:headEnd type="none" w="med" len="med"/>
+                      <a:tailEnd type="none" w="med" len="med"/>
+                    </a:lnR>
+                    <a:lnT w="12700" cap="flat" cmpd="sng" algn="ctr">
+                      <a:noFill/>
+                      <a:prstDash val="solid"/>
+                      <a:round/>
+                      <a:headEnd type="none" w="med" len="med"/>
+                      <a:tailEnd type="none" w="med" len="med"/>
+                    </a:lnT>
+                    <a:lnB w="12700" cap="flat" cmpd="sng" algn="ctr">
+                      <a:noFill/>
+                      <a:prstDash val="solid"/>
+                      <a:round/>
+                      <a:headEnd type="none" w="med" len="med"/>
+                      <a:tailEnd type="none" w="med" len="med"/>
+                    </a:lnB>
+                  </a:tcPr>
+                </a:tc>
+                <a:tc>
+                  <a:txBody>
+                    <a:bodyPr/>
+                    <a:lstStyle/>
+                    <a:p>
+                      <a:pPr algn="ctr"/>
+                      <a:r>
+                        <a:rPr lang="en-US" sz="4400" b="1" dirty="0" smtClean="0"/>
+                        <a:t>None</a:t>
+                      </a:r>
+                      <a:endParaRPr lang="en-US" sz="4400" b="1" dirty="0"/>
+                    </a:p>
+                  </a:txBody>
+                  <a:tcPr>
+                    <a:lnL w="12700" cap="flat" cmpd="sng" algn="ctr">
+                      <a:noFill/>
+                      <a:prstDash val="solid"/>
+                      <a:round/>
+                      <a:headEnd type="none" w="med" len="med"/>
+                      <a:tailEnd type="none" w="med" len="med"/>
+                    </a:lnL>
+                    <a:lnR w="12700" cap="flat" cmpd="sng" algn="ctr">
+                      <a:noFill/>
+                      <a:prstDash val="solid"/>
+                      <a:round/>
+                      <a:headEnd type="none" w="med" len="med"/>
+                      <a:tailEnd type="none" w="med" len="med"/>
+                    </a:lnR>
+                    <a:lnT w="12700" cap="flat" cmpd="sng" algn="ctr">
+                      <a:noFill/>
+                      <a:prstDash val="solid"/>
+                      <a:round/>
+                      <a:headEnd type="none" w="med" len="med"/>
+                      <a:tailEnd type="none" w="med" len="med"/>
+                    </a:lnT>
+                    <a:lnB w="12700" cap="flat" cmpd="sng" algn="ctr">
+                      <a:noFill/>
+                      <a:prstDash val="solid"/>
+                      <a:round/>
+                      <a:headEnd type="none" w="med" len="med"/>
+                      <a:tailEnd type="none" w="med" len="med"/>
+                    </a:lnB>
+                  </a:tcPr>
+                </a:tc>
+                <a:tc>
+                  <a:txBody>
+                    <a:bodyPr/>
+                    <a:lstStyle/>
+                    <a:p>
+                      <a:pPr algn="ctr"/>
+                      <a:endParaRPr lang="en-US" sz="4400" b="1" dirty="0"/>
+                    </a:p>
+                  </a:txBody>
+                  <a:tcPr>
+                    <a:lnL w="12700" cap="flat" cmpd="sng" algn="ctr">
+                      <a:noFill/>
+                      <a:prstDash val="solid"/>
+                      <a:round/>
+                      <a:headEnd type="none" w="med" len="med"/>
+                      <a:tailEnd type="none" w="med" len="med"/>
+                    </a:lnL>
+                    <a:lnR w="12700" cap="flat" cmpd="sng" algn="ctr">
+                      <a:noFill/>
+                      <a:prstDash val="solid"/>
+                      <a:round/>
+                      <a:headEnd type="none" w="med" len="med"/>
+                      <a:tailEnd type="none" w="med" len="med"/>
+                    </a:lnR>
+                    <a:lnT w="12700" cap="flat" cmpd="sng" algn="ctr">
+                      <a:noFill/>
+                      <a:prstDash val="solid"/>
+                      <a:round/>
+                      <a:headEnd type="none" w="med" len="med"/>
+                      <a:tailEnd type="none" w="med" len="med"/>
+                    </a:lnT>
+                    <a:lnB w="12700" cap="flat" cmpd="sng" algn="ctr">
+                      <a:noFill/>
+                      <a:prstDash val="solid"/>
+                      <a:round/>
+                      <a:headEnd type="none" w="med" len="med"/>
+                      <a:tailEnd type="none" w="med" len="med"/>
+                    </a:lnB>
+                  </a:tcPr>
+                </a:tc>
+              </a:tr>
+              <a:tr h="1223682">
+                <a:tc>
+                  <a:txBody>
+                    <a:bodyPr/>
+                    <a:lstStyle/>
+                    <a:p>
+                      <a:pPr algn="ctr"/>
+                      <a:r>
+                        <a:rPr lang="en-US" sz="4400" b="1" dirty="0" smtClean="0"/>
+                        <a:t>A* Area Avoidance</a:t>
+                      </a:r>
+                      <a:endParaRPr lang="en-US" sz="4400" b="1" dirty="0"/>
+                    </a:p>
+                  </a:txBody>
+                  <a:tcPr>
+                    <a:lnL w="12700" cap="flat" cmpd="sng" algn="ctr">
+                      <a:noFill/>
+                      <a:prstDash val="solid"/>
+                      <a:round/>
+                      <a:headEnd type="none" w="med" len="med"/>
+                      <a:tailEnd type="none" w="med" len="med"/>
+                    </a:lnL>
+                    <a:lnR w="12700" cap="flat" cmpd="sng" algn="ctr">
+                      <a:noFill/>
+                      <a:prstDash val="solid"/>
+                      <a:round/>
+                      <a:headEnd type="none" w="med" len="med"/>
+                      <a:tailEnd type="none" w="med" len="med"/>
+                    </a:lnR>
+                    <a:lnT w="12700" cap="flat" cmpd="sng" algn="ctr">
+                      <a:noFill/>
+                      <a:prstDash val="solid"/>
+                      <a:round/>
+                      <a:headEnd type="none" w="med" len="med"/>
+                      <a:tailEnd type="none" w="med" len="med"/>
+                    </a:lnT>
+                    <a:lnB w="12700" cap="flat" cmpd="sng" algn="ctr">
+                      <a:noFill/>
+                      <a:prstDash val="solid"/>
+                      <a:round/>
+                      <a:headEnd type="none" w="med" len="med"/>
+                      <a:tailEnd type="none" w="med" len="med"/>
+                    </a:lnB>
+                  </a:tcPr>
+                </a:tc>
+                <a:tc>
+                  <a:txBody>
+                    <a:bodyPr/>
+                    <a:lstStyle/>
+                    <a:p>
+                      <a:pPr algn="ctr"/>
+                      <a:r>
+                        <a:rPr lang="en-US" sz="4400" b="1" dirty="0" smtClean="0"/>
+                        <a:t>None</a:t>
+                      </a:r>
+                      <a:endParaRPr lang="en-US" sz="4400" b="1" dirty="0"/>
+                    </a:p>
+                  </a:txBody>
+                  <a:tcPr>
+                    <a:lnL w="12700" cap="flat" cmpd="sng" algn="ctr">
+                      <a:noFill/>
+                      <a:prstDash val="solid"/>
+                      <a:round/>
+                      <a:headEnd type="none" w="med" len="med"/>
+                      <a:tailEnd type="none" w="med" len="med"/>
+                    </a:lnL>
+                    <a:lnR w="12700" cap="flat" cmpd="sng" algn="ctr">
+                      <a:noFill/>
+                      <a:prstDash val="solid"/>
+                      <a:round/>
+                      <a:headEnd type="none" w="med" len="med"/>
+                      <a:tailEnd type="none" w="med" len="med"/>
+                    </a:lnR>
+                    <a:lnT w="12700" cap="flat" cmpd="sng" algn="ctr">
+                      <a:noFill/>
+                      <a:prstDash val="solid"/>
+                      <a:round/>
+                      <a:headEnd type="none" w="med" len="med"/>
+                      <a:tailEnd type="none" w="med" len="med"/>
+                    </a:lnT>
+                    <a:lnB w="12700" cap="flat" cmpd="sng" algn="ctr">
+                      <a:noFill/>
+                      <a:prstDash val="solid"/>
+                      <a:round/>
+                      <a:headEnd type="none" w="med" len="med"/>
+                      <a:tailEnd type="none" w="med" len="med"/>
+                    </a:lnB>
+                  </a:tcPr>
+                </a:tc>
+                <a:tc>
+                  <a:txBody>
+                    <a:bodyPr/>
+                    <a:lstStyle/>
+                    <a:p>
+                      <a:pPr algn="ctr"/>
+                      <a:endParaRPr lang="en-US" sz="4400" b="1" dirty="0"/>
+                    </a:p>
+                  </a:txBody>
+                  <a:tcPr>
+                    <a:lnL w="12700" cap="flat" cmpd="sng" algn="ctr">
+                      <a:noFill/>
+                      <a:prstDash val="solid"/>
+                      <a:round/>
+                      <a:headEnd type="none" w="med" len="med"/>
+                      <a:tailEnd type="none" w="med" len="med"/>
+                    </a:lnL>
+                    <a:lnR w="12700" cap="flat" cmpd="sng" algn="ctr">
+                      <a:noFill/>
+                      <a:prstDash val="solid"/>
+                      <a:round/>
+                      <a:headEnd type="none" w="med" len="med"/>
+                      <a:tailEnd type="none" w="med" len="med"/>
+                    </a:lnR>
+                    <a:lnT w="12700" cap="flat" cmpd="sng" algn="ctr">
+                      <a:noFill/>
+                      <a:prstDash val="solid"/>
+                      <a:round/>
+                      <a:headEnd type="none" w="med" len="med"/>
+                      <a:tailEnd type="none" w="med" len="med"/>
+                    </a:lnT>
+                    <a:lnB w="12700" cap="flat" cmpd="sng" algn="ctr">
+                      <a:noFill/>
+                      <a:prstDash val="solid"/>
+                      <a:round/>
+                      <a:headEnd type="none" w="med" len="med"/>
+                      <a:tailEnd type="none" w="med" len="med"/>
+                    </a:lnB>
+                    <a:lnTlToBr w="12700" cmpd="sng">
+                      <a:noFill/>
+                      <a:prstDash val="solid"/>
+                    </a:lnTlToBr>
+                    <a:lnBlToTr w="12700" cmpd="sng">
+                      <a:noFill/>
+                      <a:prstDash val="solid"/>
+                    </a:lnBlToTr>
+                  </a:tcPr>
+                </a:tc>
+              </a:tr>
+              <a:tr h="1223682">
+                <a:tc>
+                  <a:txBody>
+                    <a:bodyPr/>
+                    <a:lstStyle/>
+                    <a:p>
+                      <a:pPr algn="ctr"/>
+                      <a:endParaRPr lang="en-US" sz="4400" b="1" dirty="0"/>
+                    </a:p>
+                  </a:txBody>
+                  <a:tcPr>
+                    <a:lnL w="12700" cap="flat" cmpd="sng" algn="ctr">
+                      <a:noFill/>
+                      <a:prstDash val="solid"/>
+                      <a:round/>
+                      <a:headEnd type="none" w="med" len="med"/>
+                      <a:tailEnd type="none" w="med" len="med"/>
+                    </a:lnL>
+                    <a:lnR w="12700" cap="flat" cmpd="sng" algn="ctr">
+                      <a:noFill/>
+                      <a:prstDash val="solid"/>
+                      <a:round/>
+                      <a:headEnd type="none" w="med" len="med"/>
+                      <a:tailEnd type="none" w="med" len="med"/>
+                    </a:lnR>
+                    <a:lnT w="12700" cap="flat" cmpd="sng" algn="ctr">
+                      <a:noFill/>
+                      <a:prstDash val="solid"/>
+                      <a:round/>
+                      <a:headEnd type="none" w="med" len="med"/>
+                      <a:tailEnd type="none" w="med" len="med"/>
+                    </a:lnT>
+                    <a:lnB w="12700" cap="flat" cmpd="sng" algn="ctr">
+                      <a:noFill/>
+                      <a:prstDash val="solid"/>
+                      <a:round/>
+                      <a:headEnd type="none" w="med" len="med"/>
+                      <a:tailEnd type="none" w="med" len="med"/>
+                    </a:lnB>
+                  </a:tcPr>
+                </a:tc>
+                <a:tc>
+                  <a:txBody>
+                    <a:bodyPr/>
+                    <a:lstStyle/>
+                    <a:p>
+                      <a:pPr algn="ctr"/>
+                      <a:endParaRPr lang="en-US" sz="4400" b="1" dirty="0"/>
+                    </a:p>
+                  </a:txBody>
+                  <a:tcPr>
+                    <a:lnL w="12700" cap="flat" cmpd="sng" algn="ctr">
+                      <a:noFill/>
+                      <a:prstDash val="solid"/>
+                      <a:round/>
+                      <a:headEnd type="none" w="med" len="med"/>
+                      <a:tailEnd type="none" w="med" len="med"/>
+                    </a:lnL>
+                    <a:lnR w="12700" cap="flat" cmpd="sng" algn="ctr">
+                      <a:noFill/>
+                      <a:prstDash val="solid"/>
+                      <a:round/>
+                      <a:headEnd type="none" w="med" len="med"/>
+                      <a:tailEnd type="none" w="med" len="med"/>
+                    </a:lnR>
+                    <a:lnT w="12700" cap="flat" cmpd="sng" algn="ctr">
+                      <a:noFill/>
+                      <a:prstDash val="solid"/>
+                      <a:round/>
+                      <a:headEnd type="none" w="med" len="med"/>
+                      <a:tailEnd type="none" w="med" len="med"/>
+                    </a:lnT>
+                    <a:lnB w="12700" cap="flat" cmpd="sng" algn="ctr">
+                      <a:noFill/>
+                      <a:prstDash val="solid"/>
+                      <a:round/>
+                      <a:headEnd type="none" w="med" len="med"/>
+                      <a:tailEnd type="none" w="med" len="med"/>
+                    </a:lnB>
+                  </a:tcPr>
+                </a:tc>
+                <a:tc>
+                  <a:txBody>
+                    <a:bodyPr/>
+                    <a:lstStyle/>
+                    <a:p>
+                      <a:pPr algn="ctr"/>
+                      <a:endParaRPr lang="en-US" sz="4400" b="1" dirty="0"/>
+                    </a:p>
+                  </a:txBody>
+                  <a:tcPr>
+                    <a:lnL w="12700" cap="flat" cmpd="sng" algn="ctr">
+                      <a:noFill/>
+                      <a:prstDash val="solid"/>
+                      <a:round/>
+                      <a:headEnd type="none" w="med" len="med"/>
+                      <a:tailEnd type="none" w="med" len="med"/>
+                    </a:lnL>
+                    <a:lnR w="12700" cap="flat" cmpd="sng" algn="ctr">
+                      <a:noFill/>
+                      <a:prstDash val="solid"/>
+                      <a:round/>
+                      <a:headEnd type="none" w="med" len="med"/>
+                      <a:tailEnd type="none" w="med" len="med"/>
+                    </a:lnR>
+                    <a:lnT w="12700" cap="flat" cmpd="sng" algn="ctr">
+                      <a:noFill/>
+                      <a:prstDash val="solid"/>
+                      <a:round/>
+                      <a:headEnd type="none" w="med" len="med"/>
+                      <a:tailEnd type="none" w="med" len="med"/>
+                    </a:lnT>
+                    <a:lnB w="12700" cap="flat" cmpd="sng" algn="ctr">
+                      <a:noFill/>
+                      <a:prstDash val="solid"/>
+                      <a:round/>
+                      <a:headEnd type="none" w="med" len="med"/>
+                      <a:tailEnd type="none" w="med" len="med"/>
+                    </a:lnB>
+                  </a:tcPr>
+                </a:tc>
+              </a:tr>
+              <a:tr h="1223682">
+                <a:tc>
+                  <a:txBody>
+                    <a:bodyPr/>
+                    <a:lstStyle/>
+                    <a:p>
+                      <a:pPr algn="ctr"/>
+                      <a:endParaRPr lang="en-US" sz="4400" b="1" dirty="0"/>
+                    </a:p>
+                  </a:txBody>
+                  <a:tcPr>
+                    <a:lnL w="12700" cap="flat" cmpd="sng" algn="ctr">
+                      <a:noFill/>
+                      <a:prstDash val="solid"/>
+                      <a:round/>
+                      <a:headEnd type="none" w="med" len="med"/>
+                      <a:tailEnd type="none" w="med" len="med"/>
+                    </a:lnL>
+                    <a:lnR w="12700" cap="flat" cmpd="sng" algn="ctr">
+                      <a:noFill/>
+                      <a:prstDash val="solid"/>
+                      <a:round/>
+                      <a:headEnd type="none" w="med" len="med"/>
+                      <a:tailEnd type="none" w="med" len="med"/>
+                    </a:lnR>
+                    <a:lnT w="12700" cap="flat" cmpd="sng" algn="ctr">
+                      <a:noFill/>
+                      <a:prstDash val="solid"/>
+                      <a:round/>
+                      <a:headEnd type="none" w="med" len="med"/>
+                      <a:tailEnd type="none" w="med" len="med"/>
+                    </a:lnT>
+                    <a:lnB w="12700" cap="flat" cmpd="sng" algn="ctr">
+                      <a:noFill/>
+                      <a:prstDash val="solid"/>
+                      <a:round/>
+                      <a:headEnd type="none" w="med" len="med"/>
+                      <a:tailEnd type="none" w="med" len="med"/>
+                    </a:lnB>
+                  </a:tcPr>
+                </a:tc>
+                <a:tc>
+                  <a:txBody>
+                    <a:bodyPr/>
+                    <a:lstStyle/>
+                    <a:p>
+                      <a:pPr algn="ctr"/>
+                      <a:endParaRPr lang="en-US" sz="4400" b="1" dirty="0"/>
+                    </a:p>
+                  </a:txBody>
+                  <a:tcPr>
+                    <a:lnL w="12700" cap="flat" cmpd="sng" algn="ctr">
+                      <a:noFill/>
+                      <a:prstDash val="solid"/>
+                      <a:round/>
+                      <a:headEnd type="none" w="med" len="med"/>
+                      <a:tailEnd type="none" w="med" len="med"/>
+                    </a:lnL>
+                    <a:lnR w="12700" cap="flat" cmpd="sng" algn="ctr">
+                      <a:noFill/>
+                      <a:prstDash val="solid"/>
+                      <a:round/>
+                      <a:headEnd type="none" w="med" len="med"/>
+                      <a:tailEnd type="none" w="med" len="med"/>
+                    </a:lnR>
+                    <a:lnT w="12700" cap="flat" cmpd="sng" algn="ctr">
+                      <a:noFill/>
+                      <a:prstDash val="solid"/>
+                      <a:round/>
+                      <a:headEnd type="none" w="med" len="med"/>
+                      <a:tailEnd type="none" w="med" len="med"/>
+                    </a:lnT>
+                    <a:lnB w="12700" cap="flat" cmpd="sng" algn="ctr">
+                      <a:noFill/>
+                      <a:prstDash val="solid"/>
+                      <a:round/>
+                      <a:headEnd type="none" w="med" len="med"/>
+                      <a:tailEnd type="none" w="med" len="med"/>
+                    </a:lnB>
+                  </a:tcPr>
+                </a:tc>
+                <a:tc>
+                  <a:txBody>
+                    <a:bodyPr/>
+                    <a:lstStyle/>
+                    <a:p>
+                      <a:pPr algn="ctr"/>
+                      <a:endParaRPr lang="en-US" sz="4400" b="1" dirty="0"/>
+                    </a:p>
+                  </a:txBody>
+                  <a:tcPr>
+                    <a:lnL w="12700" cap="flat" cmpd="sng" algn="ctr">
+                      <a:noFill/>
+                      <a:prstDash val="solid"/>
+                      <a:round/>
+                      <a:headEnd type="none" w="med" len="med"/>
+                      <a:tailEnd type="none" w="med" len="med"/>
+                    </a:lnL>
+                    <a:lnR w="12700" cap="flat" cmpd="sng" algn="ctr">
+                      <a:noFill/>
+                      <a:prstDash val="solid"/>
+                      <a:round/>
+                      <a:headEnd type="none" w="med" len="med"/>
+                      <a:tailEnd type="none" w="med" len="med"/>
+                    </a:lnR>
+                    <a:lnT w="12700" cap="flat" cmpd="sng" algn="ctr">
+                      <a:noFill/>
+                      <a:prstDash val="solid"/>
+                      <a:round/>
+                      <a:headEnd type="none" w="med" len="med"/>
+                      <a:tailEnd type="none" w="med" len="med"/>
+                    </a:lnT>
+                    <a:lnB w="12700" cap="flat" cmpd="sng" algn="ctr">
+                      <a:noFill/>
+                      <a:prstDash val="solid"/>
+                      <a:round/>
+                      <a:headEnd type="none" w="med" len="med"/>
+                      <a:tailEnd type="none" w="med" len="med"/>
+                    </a:lnB>
+                  </a:tcPr>
+                </a:tc>
+              </a:tr>
+              <a:tr h="1223682">
+                <a:tc>
+                  <a:txBody>
+                    <a:bodyPr/>
+                    <a:lstStyle/>
+                    <a:p>
+                      <a:pPr algn="ctr"/>
+                      <a:endParaRPr lang="en-US" sz="4400" b="1" dirty="0"/>
+                    </a:p>
+                  </a:txBody>
+                  <a:tcPr>
+                    <a:lnL w="12700" cap="flat" cmpd="sng" algn="ctr">
+                      <a:noFill/>
+                      <a:prstDash val="solid"/>
+                      <a:round/>
+                      <a:headEnd type="none" w="med" len="med"/>
+                      <a:tailEnd type="none" w="med" len="med"/>
+                    </a:lnL>
+                    <a:lnR w="12700" cap="flat" cmpd="sng" algn="ctr">
+                      <a:noFill/>
+                      <a:prstDash val="solid"/>
+                      <a:round/>
+                      <a:headEnd type="none" w="med" len="med"/>
+                      <a:tailEnd type="none" w="med" len="med"/>
+                    </a:lnR>
+                    <a:lnT w="12700" cap="flat" cmpd="sng" algn="ctr">
+                      <a:noFill/>
+                      <a:prstDash val="solid"/>
+                      <a:round/>
+                      <a:headEnd type="none" w="med" len="med"/>
+                      <a:tailEnd type="none" w="med" len="med"/>
+                    </a:lnT>
+                    <a:lnB w="12700" cap="flat" cmpd="sng" algn="ctr">
+                      <a:noFill/>
+                      <a:prstDash val="solid"/>
+                      <a:round/>
+                      <a:headEnd type="none" w="med" len="med"/>
+                      <a:tailEnd type="none" w="med" len="med"/>
+                    </a:lnB>
+                  </a:tcPr>
+                </a:tc>
+                <a:tc>
+                  <a:txBody>
+                    <a:bodyPr/>
+                    <a:lstStyle/>
+                    <a:p>
+                      <a:pPr algn="ctr"/>
+                      <a:endParaRPr lang="en-US" sz="4400" b="1" dirty="0"/>
+                    </a:p>
+                  </a:txBody>
+                  <a:tcPr>
+                    <a:lnL w="12700" cap="flat" cmpd="sng" algn="ctr">
+                      <a:noFill/>
+                      <a:prstDash val="solid"/>
+                      <a:round/>
+                      <a:headEnd type="none" w="med" len="med"/>
+                      <a:tailEnd type="none" w="med" len="med"/>
+                    </a:lnL>
+                    <a:lnR w="12700" cap="flat" cmpd="sng" algn="ctr">
+                      <a:noFill/>
+                      <a:prstDash val="solid"/>
+                      <a:round/>
+                      <a:headEnd type="none" w="med" len="med"/>
+                      <a:tailEnd type="none" w="med" len="med"/>
+                    </a:lnR>
+                    <a:lnT w="12700" cap="flat" cmpd="sng" algn="ctr">
+                      <a:noFill/>
+                      <a:prstDash val="solid"/>
+                      <a:round/>
+                      <a:headEnd type="none" w="med" len="med"/>
+                      <a:tailEnd type="none" w="med" len="med"/>
+                    </a:lnT>
+                    <a:lnB w="12700" cap="flat" cmpd="sng" algn="ctr">
+                      <a:noFill/>
+                      <a:prstDash val="solid"/>
+                      <a:round/>
+                      <a:headEnd type="none" w="med" len="med"/>
+                      <a:tailEnd type="none" w="med" len="med"/>
+                    </a:lnB>
+                  </a:tcPr>
+                </a:tc>
+                <a:tc>
+                  <a:txBody>
+                    <a:bodyPr/>
+                    <a:lstStyle/>
+                    <a:p>
+                      <a:pPr algn="ctr"/>
+                      <a:endParaRPr lang="en-US" sz="4400" b="1" dirty="0"/>
+                    </a:p>
+                  </a:txBody>
+                  <a:tcPr>
+                    <a:lnL w="12700" cap="flat" cmpd="sng" algn="ctr">
+                      <a:noFill/>
+                      <a:prstDash val="solid"/>
+                      <a:round/>
+                      <a:headEnd type="none" w="med" len="med"/>
+                      <a:tailEnd type="none" w="med" len="med"/>
+                    </a:lnL>
+                    <a:lnR w="12700" cap="flat" cmpd="sng" algn="ctr">
+                      <a:noFill/>
+                      <a:prstDash val="solid"/>
+                      <a:round/>
+                      <a:headEnd type="none" w="med" len="med"/>
+                      <a:tailEnd type="none" w="med" len="med"/>
+                    </a:lnR>
+                    <a:lnT w="12700" cap="flat" cmpd="sng" algn="ctr">
+                      <a:noFill/>
+                      <a:prstDash val="solid"/>
+                      <a:round/>
+                      <a:headEnd type="none" w="med" len="med"/>
+                      <a:tailEnd type="none" w="med" len="med"/>
+                    </a:lnT>
+                    <a:lnB w="12700" cap="flat" cmpd="sng" algn="ctr">
+                      <a:noFill/>
+                      <a:prstDash val="solid"/>
+                      <a:round/>
+                      <a:headEnd type="none" w="med" len="med"/>
+                      <a:tailEnd type="none" w="med" len="med"/>
+                    </a:lnB>
+                  </a:tcPr>
+                </a:tc>
+              </a:tr>
+              <a:tr h="1223682">
+                <a:tc>
+                  <a:txBody>
+                    <a:bodyPr/>
+                    <a:lstStyle/>
+                    <a:p>
+                      <a:pPr algn="ctr"/>
+                      <a:endParaRPr lang="en-US" sz="4400" b="1" dirty="0"/>
+                    </a:p>
+                  </a:txBody>
+                  <a:tcPr>
+                    <a:lnL w="12700" cap="flat" cmpd="sng" algn="ctr">
+                      <a:noFill/>
+                      <a:prstDash val="solid"/>
+                      <a:round/>
+                      <a:headEnd type="none" w="med" len="med"/>
+                      <a:tailEnd type="none" w="med" len="med"/>
+                    </a:lnL>
+                    <a:lnR w="12700" cap="flat" cmpd="sng" algn="ctr">
+                      <a:noFill/>
+                      <a:prstDash val="solid"/>
+                      <a:round/>
+                      <a:headEnd type="none" w="med" len="med"/>
+                      <a:tailEnd type="none" w="med" len="med"/>
+                    </a:lnR>
+                    <a:lnT w="12700" cap="flat" cmpd="sng" algn="ctr">
+                      <a:noFill/>
+                      <a:prstDash val="solid"/>
+                      <a:round/>
+                      <a:headEnd type="none" w="med" len="med"/>
+                      <a:tailEnd type="none" w="med" len="med"/>
+                    </a:lnT>
+                    <a:lnB w="12700" cap="flat" cmpd="sng" algn="ctr">
+                      <a:noFill/>
+                      <a:prstDash val="solid"/>
+                      <a:round/>
+                      <a:headEnd type="none" w="med" len="med"/>
+                      <a:tailEnd type="none" w="med" len="med"/>
+                    </a:lnB>
+                  </a:tcPr>
+                </a:tc>
+                <a:tc>
+                  <a:txBody>
+                    <a:bodyPr/>
+                    <a:lstStyle/>
+                    <a:p>
+                      <a:pPr algn="ctr"/>
+                      <a:endParaRPr lang="en-US" sz="4400" b="1" dirty="0"/>
+                    </a:p>
+                  </a:txBody>
+                  <a:tcPr>
+                    <a:lnL w="12700" cap="flat" cmpd="sng" algn="ctr">
+                      <a:noFill/>
+                      <a:prstDash val="solid"/>
+                      <a:round/>
+                      <a:headEnd type="none" w="med" len="med"/>
+                      <a:tailEnd type="none" w="med" len="med"/>
+                    </a:lnL>
+                    <a:lnR w="12700" cap="flat" cmpd="sng" algn="ctr">
+                      <a:noFill/>
+                      <a:prstDash val="solid"/>
+                      <a:round/>
+                      <a:headEnd type="none" w="med" len="med"/>
+                      <a:tailEnd type="none" w="med" len="med"/>
+                    </a:lnR>
+                    <a:lnT w="12700" cap="flat" cmpd="sng" algn="ctr">
+                      <a:noFill/>
+                      <a:prstDash val="solid"/>
+                      <a:round/>
+                      <a:headEnd type="none" w="med" len="med"/>
+                      <a:tailEnd type="none" w="med" len="med"/>
+                    </a:lnT>
+                    <a:lnB w="12700" cap="flat" cmpd="sng" algn="ctr">
+                      <a:noFill/>
+                      <a:prstDash val="solid"/>
+                      <a:round/>
+                      <a:headEnd type="none" w="med" len="med"/>
+                      <a:tailEnd type="none" w="med" len="med"/>
+                    </a:lnB>
+                  </a:tcPr>
+                </a:tc>
+                <a:tc>
+                  <a:txBody>
+                    <a:bodyPr/>
+                    <a:lstStyle/>
+                    <a:p>
+                      <a:pPr algn="ctr"/>
+                      <a:endParaRPr lang="en-US" sz="4400" b="1" dirty="0"/>
+                    </a:p>
+                  </a:txBody>
+                  <a:tcPr>
+                    <a:lnL w="12700" cap="flat" cmpd="sng" algn="ctr">
+                      <a:noFill/>
+                      <a:prstDash val="solid"/>
+                      <a:round/>
+                      <a:headEnd type="none" w="med" len="med"/>
+                      <a:tailEnd type="none" w="med" len="med"/>
+                    </a:lnL>
+                    <a:lnR w="12700" cap="flat" cmpd="sng" algn="ctr">
+                      <a:noFill/>
+                      <a:prstDash val="solid"/>
+                      <a:round/>
+                      <a:headEnd type="none" w="med" len="med"/>
+                      <a:tailEnd type="none" w="med" len="med"/>
+                    </a:lnR>
+                    <a:lnT w="12700" cap="flat" cmpd="sng" algn="ctr">
+                      <a:noFill/>
+                      <a:prstDash val="solid"/>
+                      <a:round/>
+                      <a:headEnd type="none" w="med" len="med"/>
+                      <a:tailEnd type="none" w="med" len="med"/>
+                    </a:lnT>
+                    <a:lnB w="12700" cap="flat" cmpd="sng" algn="ctr">
+                      <a:noFill/>
+                      <a:prstDash val="solid"/>
+                      <a:round/>
+                      <a:headEnd type="none" w="med" len="med"/>
+                      <a:tailEnd type="none" w="med" len="med"/>
+                    </a:lnB>
+                  </a:tcPr>
+                </a:tc>
+              </a:tr>
+              <a:tr h="1223682">
+                <a:tc>
+                  <a:txBody>
+                    <a:bodyPr/>
+                    <a:lstStyle/>
+                    <a:p>
+                      <a:pPr algn="ctr"/>
+                      <a:endParaRPr lang="en-US" sz="4400" b="1" dirty="0"/>
+                    </a:p>
+                  </a:txBody>
+                  <a:tcPr>
+                    <a:lnL w="12700" cap="flat" cmpd="sng" algn="ctr">
+                      <a:noFill/>
+                      <a:prstDash val="solid"/>
+                      <a:round/>
+                      <a:headEnd type="none" w="med" len="med"/>
+                      <a:tailEnd type="none" w="med" len="med"/>
+                    </a:lnL>
+                    <a:lnR w="12700" cap="flat" cmpd="sng" algn="ctr">
+                      <a:noFill/>
+                      <a:prstDash val="solid"/>
+                      <a:round/>
+                      <a:headEnd type="none" w="med" len="med"/>
+                      <a:tailEnd type="none" w="med" len="med"/>
+                    </a:lnR>
+                    <a:lnT w="12700" cap="flat" cmpd="sng" algn="ctr">
+                      <a:noFill/>
+                      <a:prstDash val="solid"/>
+                      <a:round/>
+                      <a:headEnd type="none" w="med" len="med"/>
+                      <a:tailEnd type="none" w="med" len="med"/>
+                    </a:lnT>
+                    <a:lnB w="12700" cap="flat" cmpd="sng" algn="ctr">
+                      <a:noFill/>
+                      <a:prstDash val="solid"/>
+                      <a:round/>
+                      <a:headEnd type="none" w="med" len="med"/>
+                      <a:tailEnd type="none" w="med" len="med"/>
+                    </a:lnB>
+                  </a:tcPr>
+                </a:tc>
+                <a:tc>
+                  <a:txBody>
+                    <a:bodyPr/>
+                    <a:lstStyle/>
+                    <a:p>
+                      <a:pPr algn="ctr"/>
+                      <a:endParaRPr lang="en-US" sz="4400" b="1" dirty="0"/>
+                    </a:p>
+                  </a:txBody>
+                  <a:tcPr>
+                    <a:lnL w="12700" cap="flat" cmpd="sng" algn="ctr">
+                      <a:noFill/>
+                      <a:prstDash val="solid"/>
+                      <a:round/>
+                      <a:headEnd type="none" w="med" len="med"/>
+                      <a:tailEnd type="none" w="med" len="med"/>
+                    </a:lnL>
+                    <a:lnR w="12700" cap="flat" cmpd="sng" algn="ctr">
+                      <a:noFill/>
+                      <a:prstDash val="solid"/>
+                      <a:round/>
+                      <a:headEnd type="none" w="med" len="med"/>
+                      <a:tailEnd type="none" w="med" len="med"/>
+                    </a:lnR>
+                    <a:lnT w="12700" cap="flat" cmpd="sng" algn="ctr">
+                      <a:noFill/>
+                      <a:prstDash val="solid"/>
+                      <a:round/>
+                      <a:headEnd type="none" w="med" len="med"/>
+                      <a:tailEnd type="none" w="med" len="med"/>
+                    </a:lnT>
+                    <a:lnB w="12700" cap="flat" cmpd="sng" algn="ctr">
+                      <a:noFill/>
+                      <a:prstDash val="solid"/>
+                      <a:round/>
+                      <a:headEnd type="none" w="med" len="med"/>
+                      <a:tailEnd type="none" w="med" len="med"/>
+                    </a:lnB>
+                  </a:tcPr>
+                </a:tc>
+                <a:tc>
+                  <a:txBody>
+                    <a:bodyPr/>
+                    <a:lstStyle/>
+                    <a:p>
+                      <a:pPr algn="ctr"/>
+                      <a:endParaRPr lang="en-US" sz="4400" b="1" dirty="0"/>
+                    </a:p>
+                  </a:txBody>
+                  <a:tcPr>
+                    <a:lnL w="12700" cap="flat" cmpd="sng" algn="ctr">
+                      <a:noFill/>
+                      <a:prstDash val="solid"/>
+                      <a:round/>
+                      <a:headEnd type="none" w="med" len="med"/>
+                      <a:tailEnd type="none" w="med" len="med"/>
+                    </a:lnL>
+                    <a:lnR w="12700" cap="flat" cmpd="sng" algn="ctr">
+                      <a:noFill/>
+                      <a:prstDash val="solid"/>
+                      <a:round/>
+                      <a:headEnd type="none" w="med" len="med"/>
+                      <a:tailEnd type="none" w="med" len="med"/>
+                    </a:lnR>
+                    <a:lnT w="12700" cap="flat" cmpd="sng" algn="ctr">
+                      <a:noFill/>
+                      <a:prstDash val="solid"/>
+                      <a:round/>
+                      <a:headEnd type="none" w="med" len="med"/>
+                      <a:tailEnd type="none" w="med" len="med"/>
+                    </a:lnT>
+                    <a:lnB w="12700" cap="flat" cmpd="sng" algn="ctr">
+                      <a:noFill/>
+                      <a:prstDash val="solid"/>
+                      <a:round/>
+                      <a:headEnd type="none" w="med" len="med"/>
+                      <a:tailEnd type="none" w="med" len="med"/>
+                    </a:lnB>
+                  </a:tcPr>
+                </a:tc>
+              </a:tr>
+              <a:tr h="1223682">
+                <a:tc>
+                  <a:txBody>
+                    <a:bodyPr/>
+                    <a:lstStyle/>
+                    <a:p>
+                      <a:pPr algn="ctr"/>
+                      <a:endParaRPr lang="en-US" sz="4400" b="1" dirty="0"/>
+                    </a:p>
+                  </a:txBody>
+                  <a:tcPr>
+                    <a:lnL w="12700" cap="flat" cmpd="sng" algn="ctr">
+                      <a:noFill/>
+                      <a:prstDash val="solid"/>
+                      <a:round/>
+                      <a:headEnd type="none" w="med" len="med"/>
+                      <a:tailEnd type="none" w="med" len="med"/>
+                    </a:lnL>
+                    <a:lnR w="12700" cap="flat" cmpd="sng" algn="ctr">
+                      <a:noFill/>
+                      <a:prstDash val="solid"/>
+                      <a:round/>
+                      <a:headEnd type="none" w="med" len="med"/>
+                      <a:tailEnd type="none" w="med" len="med"/>
+                    </a:lnR>
+                    <a:lnT w="12700" cap="flat" cmpd="sng" algn="ctr">
+                      <a:noFill/>
+                      <a:prstDash val="solid"/>
+                      <a:round/>
+                      <a:headEnd type="none" w="med" len="med"/>
+                      <a:tailEnd type="none" w="med" len="med"/>
+                    </a:lnT>
+                    <a:lnB w="12700" cap="flat" cmpd="sng" algn="ctr">
+                      <a:noFill/>
+                      <a:prstDash val="solid"/>
+                      <a:round/>
+                      <a:headEnd type="none" w="med" len="med"/>
+                      <a:tailEnd type="none" w="med" len="med"/>
+                    </a:lnB>
+                  </a:tcPr>
+                </a:tc>
+                <a:tc>
+                  <a:txBody>
+                    <a:bodyPr/>
+                    <a:lstStyle/>
+                    <a:p>
+                      <a:pPr algn="ctr"/>
+                      <a:endParaRPr lang="en-US" sz="4400" b="1" dirty="0"/>
+                    </a:p>
+                  </a:txBody>
+                  <a:tcPr>
+                    <a:lnL w="12700" cap="flat" cmpd="sng" algn="ctr">
+                      <a:noFill/>
+                      <a:prstDash val="solid"/>
+                      <a:round/>
+                      <a:headEnd type="none" w="med" len="med"/>
+                      <a:tailEnd type="none" w="med" len="med"/>
+                    </a:lnL>
+                    <a:lnR w="12700" cap="flat" cmpd="sng" algn="ctr">
+                      <a:noFill/>
+                      <a:prstDash val="solid"/>
+                      <a:round/>
+                      <a:headEnd type="none" w="med" len="med"/>
+                      <a:tailEnd type="none" w="med" len="med"/>
+                    </a:lnR>
+                    <a:lnT w="12700" cap="flat" cmpd="sng" algn="ctr">
+                      <a:noFill/>
+                      <a:prstDash val="solid"/>
+                      <a:round/>
+                      <a:headEnd type="none" w="med" len="med"/>
+                      <a:tailEnd type="none" w="med" len="med"/>
+                    </a:lnT>
+                    <a:lnB w="12700" cap="flat" cmpd="sng" algn="ctr">
+                      <a:noFill/>
+                      <a:prstDash val="solid"/>
+                      <a:round/>
+                      <a:headEnd type="none" w="med" len="med"/>
+                      <a:tailEnd type="none" w="med" len="med"/>
+                    </a:lnB>
+                  </a:tcPr>
+                </a:tc>
+                <a:tc>
+                  <a:txBody>
+                    <a:bodyPr/>
+                    <a:lstStyle/>
+                    <a:p>
+                      <a:pPr algn="ctr"/>
+                      <a:endParaRPr lang="en-US" sz="4400" b="1"/>
+                    </a:p>
+                  </a:txBody>
+                  <a:tcPr>
+                    <a:lnL w="12700" cap="flat" cmpd="sng" algn="ctr">
+                      <a:noFill/>
+                      <a:prstDash val="solid"/>
+                      <a:round/>
+                      <a:headEnd type="none" w="med" len="med"/>
+                      <a:tailEnd type="none" w="med" len="med"/>
+                    </a:lnL>
+                    <a:lnR w="12700" cap="flat" cmpd="sng" algn="ctr">
+                      <a:noFill/>
+                      <a:prstDash val="solid"/>
+                      <a:round/>
+                      <a:headEnd type="none" w="med" len="med"/>
+                      <a:tailEnd type="none" w="med" len="med"/>
+                    </a:lnR>
+                    <a:lnT w="12700" cap="flat" cmpd="sng" algn="ctr">
+                      <a:noFill/>
+                      <a:prstDash val="solid"/>
+                      <a:round/>
+                      <a:headEnd type="none" w="med" len="med"/>
+                      <a:tailEnd type="none" w="med" len="med"/>
+                    </a:lnT>
+                    <a:lnB w="12700" cap="flat" cmpd="sng" algn="ctr">
+                      <a:noFill/>
+                      <a:prstDash val="solid"/>
+                      <a:round/>
+                      <a:headEnd type="none" w="med" len="med"/>
+                      <a:tailEnd type="none" w="med" len="med"/>
+                    </a:lnB>
+                  </a:tcPr>
+                </a:tc>
+              </a:tr>
+              <a:tr h="1223682">
+                <a:tc>
+                  <a:txBody>
+                    <a:bodyPr/>
+                    <a:lstStyle/>
+                    <a:p>
+                      <a:pPr algn="ctr"/>
+                      <a:endParaRPr lang="en-US" sz="4400" b="1"/>
+                    </a:p>
+                  </a:txBody>
+                  <a:tcPr>
+                    <a:lnL w="12700" cap="flat" cmpd="sng" algn="ctr">
+                      <a:noFill/>
+                      <a:prstDash val="solid"/>
+                      <a:round/>
+                      <a:headEnd type="none" w="med" len="med"/>
+                      <a:tailEnd type="none" w="med" len="med"/>
+                    </a:lnL>
+                    <a:lnR w="12700" cap="flat" cmpd="sng" algn="ctr">
+                      <a:noFill/>
+                      <a:prstDash val="solid"/>
+                      <a:round/>
+                      <a:headEnd type="none" w="med" len="med"/>
+                      <a:tailEnd type="none" w="med" len="med"/>
+                    </a:lnR>
+                    <a:lnT w="12700" cap="flat" cmpd="sng" algn="ctr">
+                      <a:noFill/>
+                      <a:prstDash val="solid"/>
+                      <a:round/>
+                      <a:headEnd type="none" w="med" len="med"/>
+                      <a:tailEnd type="none" w="med" len="med"/>
+                    </a:lnT>
+                    <a:lnB w="12700" cap="flat" cmpd="sng" algn="ctr">
+                      <a:noFill/>
+                      <a:prstDash val="solid"/>
+                      <a:round/>
+                      <a:headEnd type="none" w="med" len="med"/>
+                      <a:tailEnd type="none" w="med" len="med"/>
+                    </a:lnB>
+                  </a:tcPr>
+                </a:tc>
+                <a:tc>
+                  <a:txBody>
+                    <a:bodyPr/>
+                    <a:lstStyle/>
+                    <a:p>
+                      <a:pPr algn="ctr"/>
+                      <a:endParaRPr lang="en-US" sz="4400" b="1" dirty="0"/>
+                    </a:p>
+                  </a:txBody>
+                  <a:tcPr>
+                    <a:lnL w="12700" cap="flat" cmpd="sng" algn="ctr">
+                      <a:noFill/>
+                      <a:prstDash val="solid"/>
+                      <a:round/>
+                      <a:headEnd type="none" w="med" len="med"/>
+                      <a:tailEnd type="none" w="med" len="med"/>
+                    </a:lnL>
+                    <a:lnR w="12700" cap="flat" cmpd="sng" algn="ctr">
+                      <a:noFill/>
+                      <a:prstDash val="solid"/>
+                      <a:round/>
+                      <a:headEnd type="none" w="med" len="med"/>
+                      <a:tailEnd type="none" w="med" len="med"/>
+                    </a:lnR>
+                    <a:lnT w="12700" cap="flat" cmpd="sng" algn="ctr">
+                      <a:noFill/>
+                      <a:prstDash val="solid"/>
+                      <a:round/>
+                      <a:headEnd type="none" w="med" len="med"/>
+                      <a:tailEnd type="none" w="med" len="med"/>
+                    </a:lnT>
+                    <a:lnB w="12700" cap="flat" cmpd="sng" algn="ctr">
+                      <a:noFill/>
+                      <a:prstDash val="solid"/>
+                      <a:round/>
+                      <a:headEnd type="none" w="med" len="med"/>
+                      <a:tailEnd type="none" w="med" len="med"/>
+                    </a:lnB>
+                  </a:tcPr>
+                </a:tc>
+                <a:tc>
+                  <a:txBody>
+                    <a:bodyPr/>
+                    <a:lstStyle/>
+                    <a:p>
+                      <a:pPr algn="ctr"/>
+                      <a:endParaRPr lang="en-US" sz="4400" b="1" dirty="0"/>
+                    </a:p>
+                  </a:txBody>
+                  <a:tcPr>
+                    <a:lnL w="12700" cap="flat" cmpd="sng" algn="ctr">
+                      <a:noFill/>
+                      <a:prstDash val="solid"/>
+                      <a:round/>
+                      <a:headEnd type="none" w="med" len="med"/>
+                      <a:tailEnd type="none" w="med" len="med"/>
+                    </a:lnL>
+                    <a:lnR w="12700" cap="flat" cmpd="sng" algn="ctr">
+                      <a:noFill/>
+                      <a:prstDash val="solid"/>
+                      <a:round/>
+                      <a:headEnd type="none" w="med" len="med"/>
+                      <a:tailEnd type="none" w="med" len="med"/>
+                    </a:lnR>
+                    <a:lnT w="12700" cap="flat" cmpd="sng" algn="ctr">
+                      <a:noFill/>
+                      <a:prstDash val="solid"/>
+                      <a:round/>
+                      <a:headEnd type="none" w="med" len="med"/>
+                      <a:tailEnd type="none" w="med" len="med"/>
+                    </a:lnT>
+                    <a:lnB w="12700" cap="flat" cmpd="sng" algn="ctr">
+                      <a:noFill/>
+                      <a:prstDash val="solid"/>
+                      <a:round/>
+                      <a:headEnd type="none" w="med" len="med"/>
+                      <a:tailEnd type="none" w="med" len="med"/>
+                    </a:lnB>
+                  </a:tcPr>
+                </a:tc>
+              </a:tr>
+            </a:tbl>
+          </a:graphicData>
+        </a:graphic>
+      </p:graphicFrame>
+      <p:sp>
+        <p:nvSpPr>
+          <p:cNvPr id="8" name="TextBox 7"/>
+          <p:cNvSpPr txBox="1"/>
+          <p:nvPr/>
+        </p:nvSpPr>
+        <p:spPr>
+          <a:xfrm>
+            <a:off x="14630400" y="29260800"/>
+            <a:ext cx="17373600" cy="2554545"/>
+          </a:xfrm>
+          <a:prstGeom prst="rect">
+            <a:avLst/>
+          </a:prstGeom>
+          <a:noFill/>
+        </p:spPr>
+        <p:txBody>
+          <a:bodyPr wrap="square" rtlCol="0">
+            <a:spAutoFit/>
+          </a:bodyPr>
+          <a:lstStyle/>
+          <a:p>
+            <a:r>
+              <a:rPr lang="en-US" sz="4000" dirty="0" smtClean="0">
+                <a:latin typeface="Arial" panose="020B0604020202020204" pitchFamily="34" charset="0"/>
+                <a:cs typeface="Arial" panose="020B0604020202020204" pitchFamily="34" charset="0"/>
+              </a:rPr>
+              <a:t>     We were provided a cost calculator that determined the total cost accumulated through by all of the test flights that we found paths for. We ran several solutions and compared them to each other, as shown in the table to the left.</a:t>
+            </a:r>
+            <a:endParaRPr lang="en-US" sz="4000" dirty="0">
+              <a:latin typeface="Arial" panose="020B0604020202020204" pitchFamily="34" charset="0"/>
+              <a:cs typeface="Arial" panose="020B0604020202020204" pitchFamily="34" charset="0"/>
+            </a:endParaRPr>
+          </a:p>
+        </p:txBody>
+      </p:sp>
     </p:spTree>
     <p:extLst>
       <p:ext uri="{BB962C8B-B14F-4D97-AF65-F5344CB8AC3E}">

</xml_diff>

<commit_message>
filled in two sections of poster
</commit_message>
<xml_diff>
--- a/poster/poster.pptx
+++ b/poster/poster.pptx
@@ -341,7 +341,7 @@
     </p:spTree>
     <p:extLst>
       <p:ext uri="{BB962C8B-B14F-4D97-AF65-F5344CB8AC3E}">
-        <p14:creationId xmlns:p14="http://schemas.microsoft.com/office/powerpoint/2010/main" xmlns="" val="2603857336"/>
+        <p14:creationId xmlns:p14="http://schemas.microsoft.com/office/powerpoint/2010/main" val="2603857336"/>
       </p:ext>
     </p:extLst>
   </p:cSld>
@@ -513,7 +513,7 @@
     </p:spTree>
     <p:extLst>
       <p:ext uri="{BB962C8B-B14F-4D97-AF65-F5344CB8AC3E}">
-        <p14:creationId xmlns:p14="http://schemas.microsoft.com/office/powerpoint/2010/main" xmlns="" val="1190444423"/>
+        <p14:creationId xmlns:p14="http://schemas.microsoft.com/office/powerpoint/2010/main" val="1190444423"/>
       </p:ext>
     </p:extLst>
   </p:cSld>
@@ -695,7 +695,7 @@
     </p:spTree>
     <p:extLst>
       <p:ext uri="{BB962C8B-B14F-4D97-AF65-F5344CB8AC3E}">
-        <p14:creationId xmlns:p14="http://schemas.microsoft.com/office/powerpoint/2010/main" xmlns="" val="1091754751"/>
+        <p14:creationId xmlns:p14="http://schemas.microsoft.com/office/powerpoint/2010/main" val="1091754751"/>
       </p:ext>
     </p:extLst>
   </p:cSld>
@@ -867,7 +867,7 @@
     </p:spTree>
     <p:extLst>
       <p:ext uri="{BB962C8B-B14F-4D97-AF65-F5344CB8AC3E}">
-        <p14:creationId xmlns:p14="http://schemas.microsoft.com/office/powerpoint/2010/main" xmlns="" val="2780456844"/>
+        <p14:creationId xmlns:p14="http://schemas.microsoft.com/office/powerpoint/2010/main" val="2780456844"/>
       </p:ext>
     </p:extLst>
   </p:cSld>
@@ -1115,7 +1115,7 @@
     </p:spTree>
     <p:extLst>
       <p:ext uri="{BB962C8B-B14F-4D97-AF65-F5344CB8AC3E}">
-        <p14:creationId xmlns:p14="http://schemas.microsoft.com/office/powerpoint/2010/main" xmlns="" val="1203075770"/>
+        <p14:creationId xmlns:p14="http://schemas.microsoft.com/office/powerpoint/2010/main" val="1203075770"/>
       </p:ext>
     </p:extLst>
   </p:cSld>
@@ -1405,7 +1405,7 @@
     </p:spTree>
     <p:extLst>
       <p:ext uri="{BB962C8B-B14F-4D97-AF65-F5344CB8AC3E}">
-        <p14:creationId xmlns:p14="http://schemas.microsoft.com/office/powerpoint/2010/main" xmlns="" val="23827340"/>
+        <p14:creationId xmlns:p14="http://schemas.microsoft.com/office/powerpoint/2010/main" val="23827340"/>
       </p:ext>
     </p:extLst>
   </p:cSld>
@@ -1834,7 +1834,7 @@
     </p:spTree>
     <p:extLst>
       <p:ext uri="{BB962C8B-B14F-4D97-AF65-F5344CB8AC3E}">
-        <p14:creationId xmlns:p14="http://schemas.microsoft.com/office/powerpoint/2010/main" xmlns="" val="1304650489"/>
+        <p14:creationId xmlns:p14="http://schemas.microsoft.com/office/powerpoint/2010/main" val="1304650489"/>
       </p:ext>
     </p:extLst>
   </p:cSld>
@@ -1954,7 +1954,7 @@
     </p:spTree>
     <p:extLst>
       <p:ext uri="{BB962C8B-B14F-4D97-AF65-F5344CB8AC3E}">
-        <p14:creationId xmlns:p14="http://schemas.microsoft.com/office/powerpoint/2010/main" xmlns="" val="2817406021"/>
+        <p14:creationId xmlns:p14="http://schemas.microsoft.com/office/powerpoint/2010/main" val="2817406021"/>
       </p:ext>
     </p:extLst>
   </p:cSld>
@@ -2051,7 +2051,7 @@
     </p:spTree>
     <p:extLst>
       <p:ext uri="{BB962C8B-B14F-4D97-AF65-F5344CB8AC3E}">
-        <p14:creationId xmlns:p14="http://schemas.microsoft.com/office/powerpoint/2010/main" xmlns="" val="2016218180"/>
+        <p14:creationId xmlns:p14="http://schemas.microsoft.com/office/powerpoint/2010/main" val="2016218180"/>
       </p:ext>
     </p:extLst>
   </p:cSld>
@@ -2330,7 +2330,7 @@
     </p:spTree>
     <p:extLst>
       <p:ext uri="{BB962C8B-B14F-4D97-AF65-F5344CB8AC3E}">
-        <p14:creationId xmlns:p14="http://schemas.microsoft.com/office/powerpoint/2010/main" xmlns="" val="1955102808"/>
+        <p14:creationId xmlns:p14="http://schemas.microsoft.com/office/powerpoint/2010/main" val="1955102808"/>
       </p:ext>
     </p:extLst>
   </p:cSld>
@@ -2585,7 +2585,7 @@
     </p:spTree>
     <p:extLst>
       <p:ext uri="{BB962C8B-B14F-4D97-AF65-F5344CB8AC3E}">
-        <p14:creationId xmlns:p14="http://schemas.microsoft.com/office/powerpoint/2010/main" xmlns="" val="3862665668"/>
+        <p14:creationId xmlns:p14="http://schemas.microsoft.com/office/powerpoint/2010/main" val="3862665668"/>
       </p:ext>
     </p:extLst>
   </p:cSld>
@@ -2836,7 +2836,7 @@
     </p:spTree>
     <p:extLst>
       <p:ext uri="{BB962C8B-B14F-4D97-AF65-F5344CB8AC3E}">
-        <p14:creationId xmlns:p14="http://schemas.microsoft.com/office/powerpoint/2010/main" xmlns="" val="3142861604"/>
+        <p14:creationId xmlns:p14="http://schemas.microsoft.com/office/powerpoint/2010/main" val="3142861604"/>
       </p:ext>
     </p:extLst>
   </p:cSld>
@@ -3136,7 +3136,7 @@
           <a:blip r:embed="rId2" cstate="print">
             <a:extLst>
               <a:ext uri="{28A0092B-C50C-407E-A947-70E740481C1C}">
-                <a14:useLocalDpi xmlns:a14="http://schemas.microsoft.com/office/drawing/2010/main" xmlns="" val="0"/>
+                <a14:useLocalDpi xmlns:a14="http://schemas.microsoft.com/office/drawing/2010/main" val="0"/>
               </a:ext>
             </a:extLst>
           </a:blip>
@@ -3159,14 +3159,14 @@
           </a:ln>
           <a:extLst>
             <a:ext uri="{909E8E84-426E-40DD-AFC4-6F175D3DCCD1}">
-              <a14:hiddenFill xmlns:a14="http://schemas.microsoft.com/office/drawing/2010/main" xmlns="">
+              <a14:hiddenFill xmlns:a14="http://schemas.microsoft.com/office/drawing/2010/main">
                 <a:solidFill>
                   <a:schemeClr val="accent1"/>
                 </a:solidFill>
               </a14:hiddenFill>
             </a:ext>
             <a:ext uri="{91240B29-F687-4F45-9708-019B960494DF}">
-              <a14:hiddenLine xmlns:a14="http://schemas.microsoft.com/office/drawing/2010/main" xmlns="" w="9525">
+              <a14:hiddenLine xmlns:a14="http://schemas.microsoft.com/office/drawing/2010/main" w="9525">
                 <a:solidFill>
                   <a:schemeClr val="tx1"/>
                 </a:solidFill>
@@ -3214,7 +3214,7 @@
                 </a:ln>
                 <a:solidFill>
                   <a:schemeClr val="bg2">
-                    <a:lumMod val="90000"/>
+                    <a:lumMod val="75000"/>
                   </a:schemeClr>
                 </a:solidFill>
                 <a:effectLst>
@@ -3227,7 +3227,34 @@
                   </a:innerShdw>
                 </a:effectLst>
               </a:rPr>
-              <a:t>  	         Flight Quest (ID 36)</a:t>
+              <a:t>  	         </a:t>
+            </a:r>
+            <a:r>
+              <a:rPr lang="en-US" sz="17100" b="1" dirty="0" smtClean="0">
+                <a:ln w="900" cmpd="sng">
+                  <a:solidFill>
+                    <a:schemeClr val="tx1">
+                      <a:alpha val="55000"/>
+                    </a:schemeClr>
+                  </a:solidFill>
+                  <a:prstDash val="solid"/>
+                </a:ln>
+                <a:solidFill>
+                  <a:schemeClr val="bg2">
+                    <a:lumMod val="75000"/>
+                  </a:schemeClr>
+                </a:solidFill>
+                <a:effectLst>
+                  <a:innerShdw blurRad="101600" dist="76200" dir="5400000">
+                    <a:schemeClr val="accent1">
+                      <a:satMod val="190000"/>
+                      <a:tint val="100000"/>
+                      <a:alpha val="74000"/>
+                    </a:schemeClr>
+                  </a:innerShdw>
+                </a:effectLst>
+              </a:rPr>
+              <a:t>Flight Quest (ID 36)</a:t>
             </a:r>
           </a:p>
           <a:p>
@@ -3244,7 +3271,7 @@
               </a:ln>
               <a:solidFill>
                 <a:schemeClr val="bg2">
-                  <a:lumMod val="90000"/>
+                  <a:lumMod val="75000"/>
                 </a:schemeClr>
               </a:solidFill>
               <a:effectLst>
@@ -3305,7 +3332,7 @@
             <a:r>
               <a:rPr lang="en-US" b="1" dirty="0" smtClean="0">
                 <a:solidFill>
-                  <a:srgbClr val="9B8269"/>
+                  <a:srgbClr val="7A6652"/>
                 </a:solidFill>
                 <a:latin typeface="Arial" panose="020B0604020202020204" pitchFamily="34" charset="0"/>
                 <a:cs typeface="Arial" panose="020B0604020202020204" pitchFamily="34" charset="0"/>
@@ -3314,7 +3341,7 @@
             </a:r>
             <a:endParaRPr lang="en-US" b="1" dirty="0">
               <a:solidFill>
-                <a:srgbClr val="9B8269"/>
+                <a:srgbClr val="7A6652"/>
               </a:solidFill>
               <a:latin typeface="Arial" panose="020B0604020202020204" pitchFamily="34" charset="0"/>
               <a:cs typeface="Arial" panose="020B0604020202020204" pitchFamily="34" charset="0"/>
@@ -3367,7 +3394,7 @@
             <a:r>
               <a:rPr lang="en-US" b="1" dirty="0" smtClean="0">
                 <a:solidFill>
-                  <a:srgbClr val="9B8269"/>
+                  <a:srgbClr val="7A6652"/>
                 </a:solidFill>
                 <a:latin typeface="Arial" panose="020B0604020202020204" pitchFamily="34" charset="0"/>
                 <a:cs typeface="Arial" panose="020B0604020202020204" pitchFamily="34" charset="0"/>
@@ -3376,7 +3403,7 @@
             </a:r>
             <a:endParaRPr lang="en-US" b="1" dirty="0">
               <a:solidFill>
-                <a:srgbClr val="9B8269"/>
+                <a:srgbClr val="7A6652"/>
               </a:solidFill>
               <a:latin typeface="Arial" panose="020B0604020202020204" pitchFamily="34" charset="0"/>
               <a:cs typeface="Arial" panose="020B0604020202020204" pitchFamily="34" charset="0"/>
@@ -3429,7 +3456,7 @@
             <a:r>
               <a:rPr lang="en-US" b="1" dirty="0" smtClean="0">
                 <a:solidFill>
-                  <a:srgbClr val="9B8269"/>
+                  <a:srgbClr val="7A6652"/>
                 </a:solidFill>
                 <a:latin typeface="Arial" panose="020B0604020202020204" pitchFamily="34" charset="0"/>
                 <a:cs typeface="Arial" panose="020B0604020202020204" pitchFamily="34" charset="0"/>
@@ -3438,7 +3465,7 @@
             </a:r>
             <a:endParaRPr lang="en-US" b="1" dirty="0">
               <a:solidFill>
-                <a:srgbClr val="9B8269"/>
+                <a:srgbClr val="7A6652"/>
               </a:solidFill>
               <a:latin typeface="Arial" panose="020B0604020202020204" pitchFamily="34" charset="0"/>
               <a:cs typeface="Arial" panose="020B0604020202020204" pitchFamily="34" charset="0"/>
@@ -3590,7 +3617,7 @@
           <a:blip r:embed="rId3" cstate="print">
             <a:extLst>
               <a:ext uri="{28A0092B-C50C-407E-A947-70E740481C1C}">
-                <a14:useLocalDpi xmlns:a14="http://schemas.microsoft.com/office/drawing/2010/main" xmlns="" val="0"/>
+                <a14:useLocalDpi xmlns:a14="http://schemas.microsoft.com/office/drawing/2010/main" val="0"/>
               </a:ext>
             </a:extLst>
           </a:blip>
@@ -3613,14 +3640,14 @@
           </a:ln>
           <a:extLst>
             <a:ext uri="{909E8E84-426E-40DD-AFC4-6F175D3DCCD1}">
-              <a14:hiddenFill xmlns:a14="http://schemas.microsoft.com/office/drawing/2010/main" xmlns="">
+              <a14:hiddenFill xmlns:a14="http://schemas.microsoft.com/office/drawing/2010/main">
                 <a:solidFill>
                   <a:schemeClr val="accent1"/>
                 </a:solidFill>
               </a14:hiddenFill>
             </a:ext>
             <a:ext uri="{91240B29-F687-4F45-9708-019B960494DF}">
-              <a14:hiddenLine xmlns:a14="http://schemas.microsoft.com/office/drawing/2010/main" xmlns="" w="9525">
+              <a14:hiddenLine xmlns:a14="http://schemas.microsoft.com/office/drawing/2010/main" w="9525">
                 <a:solidFill>
                   <a:schemeClr val="tx1"/>
                 </a:solidFill>
@@ -3634,227 +3661,6 @@
       </p:pic>
       <p:sp>
         <p:nvSpPr>
-          <p:cNvPr id="2" name="TextBox 1"/>
-          <p:cNvSpPr txBox="1"/>
-          <p:nvPr/>
-        </p:nvSpPr>
-        <p:spPr>
-          <a:xfrm>
-            <a:off x="840758" y="8915467"/>
-            <a:ext cx="13452122" cy="9444235"/>
-          </a:xfrm>
-          <a:prstGeom prst="rect">
-            <a:avLst/>
-          </a:prstGeom>
-          <a:noFill/>
-        </p:spPr>
-        <p:txBody>
-          <a:bodyPr wrap="square" lIns="86978" tIns="43489" rIns="86978" bIns="43489" rtlCol="0">
-            <a:spAutoFit/>
-          </a:bodyPr>
-          <a:lstStyle/>
-          <a:p>
-            <a:r>
-              <a:rPr lang="en-US" sz="3800" dirty="0" smtClean="0">
-                <a:latin typeface="Arial" panose="020B0604020202020204" pitchFamily="34" charset="0"/>
-                <a:cs typeface="Arial" panose="020B0604020202020204" pitchFamily="34" charset="0"/>
-              </a:rPr>
-              <a:t>      In the modern day, airplanes are a frequently-used means of transportation. However, due to many different factors, such as weather, restricted areas, and </a:t>
-            </a:r>
-            <a:r>
-              <a:rPr lang="en-US" sz="3800" dirty="0" err="1" smtClean="0">
-                <a:latin typeface="Arial" panose="020B0604020202020204" pitchFamily="34" charset="0"/>
-                <a:cs typeface="Arial" panose="020B0604020202020204" pitchFamily="34" charset="0"/>
-              </a:rPr>
-              <a:t>jetstreams</a:t>
-            </a:r>
-            <a:r>
-              <a:rPr lang="en-US" sz="3800" dirty="0" smtClean="0">
-                <a:latin typeface="Arial" panose="020B0604020202020204" pitchFamily="34" charset="0"/>
-                <a:cs typeface="Arial" panose="020B0604020202020204" pitchFamily="34" charset="0"/>
-              </a:rPr>
-              <a:t>, it’s very difficult to keep the cost of such transportation at an optimal level. What we aim to do here in Flight Quest is to optimize to the best of our ability the costs of airplane flights using machine learning techniques.</a:t>
-            </a:r>
-          </a:p>
-          <a:p>
-            <a:r>
-              <a:rPr lang="en-US" sz="3800" dirty="0" smtClean="0">
-                <a:latin typeface="Arial" panose="020B0604020202020204" pitchFamily="34" charset="0"/>
-                <a:cs typeface="Arial" panose="020B0604020202020204" pitchFamily="34" charset="0"/>
-              </a:rPr>
-              <a:t>     </a:t>
-            </a:r>
-          </a:p>
-          <a:p>
-            <a:r>
-              <a:rPr lang="en-US" sz="3800" dirty="0">
-                <a:latin typeface="Arial" panose="020B0604020202020204" pitchFamily="34" charset="0"/>
-                <a:cs typeface="Arial" panose="020B0604020202020204" pitchFamily="34" charset="0"/>
-              </a:rPr>
-              <a:t> </a:t>
-            </a:r>
-            <a:r>
-              <a:rPr lang="en-US" sz="3800" dirty="0" smtClean="0">
-                <a:latin typeface="Arial" panose="020B0604020202020204" pitchFamily="34" charset="0"/>
-                <a:cs typeface="Arial" panose="020B0604020202020204" pitchFamily="34" charset="0"/>
-              </a:rPr>
-              <a:t>    Our task consists of using data obtained from previous flights to try and find optimal paths and conditions (e.g. speed, altitude) for new flights to take.</a:t>
-            </a:r>
-            <a:endParaRPr lang="en-US" sz="3800" dirty="0">
-              <a:latin typeface="Arial" panose="020B0604020202020204" pitchFamily="34" charset="0"/>
-              <a:cs typeface="Arial" panose="020B0604020202020204" pitchFamily="34" charset="0"/>
-            </a:endParaRPr>
-          </a:p>
-          <a:p>
-            <a:endParaRPr lang="en-US" sz="3800" dirty="0" smtClean="0">
-              <a:latin typeface="Arial" panose="020B0604020202020204" pitchFamily="34" charset="0"/>
-              <a:cs typeface="Arial" panose="020B0604020202020204" pitchFamily="34" charset="0"/>
-            </a:endParaRPr>
-          </a:p>
-          <a:p>
-            <a:r>
-              <a:rPr lang="en-US" sz="3800" dirty="0">
-                <a:latin typeface="Arial" panose="020B0604020202020204" pitchFamily="34" charset="0"/>
-                <a:cs typeface="Arial" panose="020B0604020202020204" pitchFamily="34" charset="0"/>
-              </a:rPr>
-              <a:t> </a:t>
-            </a:r>
-            <a:r>
-              <a:rPr lang="en-US" sz="3800" dirty="0" smtClean="0">
-                <a:latin typeface="Arial" panose="020B0604020202020204" pitchFamily="34" charset="0"/>
-                <a:cs typeface="Arial" panose="020B0604020202020204" pitchFamily="34" charset="0"/>
-              </a:rPr>
-              <a:t>    Our motivation for undertaking this task came from searching for something that would both challenge us to use what we learned in innovative ways and would have an impact on people’s lives. </a:t>
-            </a:r>
-            <a:endParaRPr lang="en-US" sz="3800" dirty="0">
-              <a:latin typeface="Arial" panose="020B0604020202020204" pitchFamily="34" charset="0"/>
-              <a:cs typeface="Arial" panose="020B0604020202020204" pitchFamily="34" charset="0"/>
-            </a:endParaRPr>
-          </a:p>
-        </p:txBody>
-      </p:sp>
-      <p:sp>
-        <p:nvSpPr>
-          <p:cNvPr id="14" name="TextBox 13"/>
-          <p:cNvSpPr txBox="1"/>
-          <p:nvPr/>
-        </p:nvSpPr>
-        <p:spPr>
-          <a:xfrm>
-            <a:off x="15974395" y="8915466"/>
-            <a:ext cx="13452122" cy="9505790"/>
-          </a:xfrm>
-          <a:prstGeom prst="rect">
-            <a:avLst/>
-          </a:prstGeom>
-          <a:noFill/>
-        </p:spPr>
-        <p:txBody>
-          <a:bodyPr wrap="square" lIns="86978" tIns="43489" rIns="86978" bIns="43489" rtlCol="0">
-            <a:spAutoFit/>
-          </a:bodyPr>
-          <a:lstStyle/>
-          <a:p>
-            <a:r>
-              <a:rPr lang="en-US" sz="3400" dirty="0" smtClean="0">
-                <a:latin typeface="Arial" panose="020B0604020202020204" pitchFamily="34" charset="0"/>
-                <a:cs typeface="Arial" panose="020B0604020202020204" pitchFamily="34" charset="0"/>
-              </a:rPr>
-              <a:t>      First, we created a baseline measure that took the most direct distance in between the current and destination points (via great circle calculation) and made that the desired path. </a:t>
-            </a:r>
-          </a:p>
-          <a:p>
-            <a:endParaRPr lang="en-US" sz="3400" dirty="0">
-              <a:latin typeface="Arial" panose="020B0604020202020204" pitchFamily="34" charset="0"/>
-              <a:cs typeface="Arial" panose="020B0604020202020204" pitchFamily="34" charset="0"/>
-            </a:endParaRPr>
-          </a:p>
-          <a:p>
-            <a:r>
-              <a:rPr lang="en-US" sz="3400" dirty="0" smtClean="0">
-                <a:latin typeface="Arial" panose="020B0604020202020204" pitchFamily="34" charset="0"/>
-                <a:cs typeface="Arial" panose="020B0604020202020204" pitchFamily="34" charset="0"/>
-              </a:rPr>
-              <a:t>	Our next step was to identify and work out a path 	around restricted areas, since no flights can pass 	through these areas lest they be shot down. In 	order to account for this, we consider numerous 	points in between our current and destination 	locations and then attempt to construct a path 	going through points that don’t lie in restricted 	areas using an A* search (as shown on left).</a:t>
-            </a:r>
-          </a:p>
-          <a:p>
-            <a:endParaRPr lang="en-US" sz="3400" dirty="0">
-              <a:latin typeface="Arial" panose="020B0604020202020204" pitchFamily="34" charset="0"/>
-              <a:cs typeface="Arial" panose="020B0604020202020204" pitchFamily="34" charset="0"/>
-            </a:endParaRPr>
-          </a:p>
-          <a:p>
-            <a:r>
-              <a:rPr lang="en-US" sz="3400" dirty="0" smtClean="0">
-                <a:latin typeface="Arial" panose="020B0604020202020204" pitchFamily="34" charset="0"/>
-                <a:cs typeface="Arial" panose="020B0604020202020204" pitchFamily="34" charset="0"/>
-              </a:rPr>
-              <a:t>     Afterwards, we focused on finding optimal speeds and altitudes for segments of the flight path in order to find the best balance between fuel consumption and arrival time. In order to do this, we would need to first find the features that would be significant enough to train on and then train our data using a regression model.</a:t>
-            </a:r>
-            <a:endParaRPr lang="en-US" sz="3400" dirty="0">
-              <a:latin typeface="Arial" panose="020B0604020202020204" pitchFamily="34" charset="0"/>
-              <a:cs typeface="Arial" panose="020B0604020202020204" pitchFamily="34" charset="0"/>
-            </a:endParaRPr>
-          </a:p>
-        </p:txBody>
-      </p:sp>
-      <p:pic>
-        <p:nvPicPr>
-          <p:cNvPr id="1027" name="Picture 3"/>
-          <p:cNvPicPr>
-            <a:picLocks noChangeAspect="1" noChangeArrowheads="1"/>
-          </p:cNvPicPr>
-          <p:nvPr/>
-        </p:nvPicPr>
-        <p:blipFill>
-          <a:blip r:embed="rId4" cstate="print">
-            <a:extLst>
-              <a:ext uri="{28A0092B-C50C-407E-A947-70E740481C1C}">
-                <a14:useLocalDpi xmlns:a14="http://schemas.microsoft.com/office/drawing/2010/main" xmlns="" val="0"/>
-              </a:ext>
-            </a:extLst>
-          </a:blip>
-          <a:srcRect/>
-          <a:stretch>
-            <a:fillRect/>
-          </a:stretch>
-        </p:blipFill>
-        <p:spPr bwMode="auto">
-          <a:xfrm>
-            <a:off x="16158311" y="10865726"/>
-            <a:ext cx="3546946" cy="4680619"/>
-          </a:xfrm>
-          <a:prstGeom prst="rect">
-            <a:avLst/>
-          </a:prstGeom>
-          <a:noFill/>
-          <a:ln>
-            <a:noFill/>
-          </a:ln>
-          <a:extLst>
-            <a:ext uri="{909E8E84-426E-40DD-AFC4-6F175D3DCCD1}">
-              <a14:hiddenFill xmlns:a14="http://schemas.microsoft.com/office/drawing/2010/main" xmlns="">
-                <a:solidFill>
-                  <a:schemeClr val="accent1"/>
-                </a:solidFill>
-              </a14:hiddenFill>
-            </a:ext>
-            <a:ext uri="{91240B29-F687-4F45-9708-019B960494DF}">
-              <a14:hiddenLine xmlns:a14="http://schemas.microsoft.com/office/drawing/2010/main" xmlns="" w="9525">
-                <a:solidFill>
-                  <a:schemeClr val="tx1"/>
-                </a:solidFill>
-                <a:miter lim="800000"/>
-                <a:headEnd/>
-                <a:tailEnd/>
-              </a14:hiddenLine>
-            </a:ext>
-          </a:extLst>
-        </p:spPr>
-      </p:pic>
-      <p:sp>
-        <p:nvSpPr>
           <p:cNvPr id="4" name="TextBox 3"/>
           <p:cNvSpPr txBox="1"/>
           <p:nvPr/>
@@ -3892,7 +3698,7 @@
           <p:nvPr>
             <p:extLst>
               <p:ext uri="{D42A27DB-BD31-4B8C-83A1-F6EECF244321}">
-                <p14:modId xmlns:p14="http://schemas.microsoft.com/office/powerpoint/2010/main" xmlns="" val="542667089"/>
+                <p14:modId xmlns:p14="http://schemas.microsoft.com/office/powerpoint/2010/main" val="542667089"/>
               </p:ext>
             </p:extLst>
           </p:nvPr>
@@ -5318,21 +5124,7 @@
                 <a:latin typeface="Arial" panose="020B0604020202020204" pitchFamily="34" charset="0"/>
                 <a:cs typeface="Arial" panose="020B0604020202020204" pitchFamily="34" charset="0"/>
               </a:rPr>
-              <a:t>     We were provided a cost calculator that determined the total cost accumulated through by all of the test flights that we found paths for. </a:t>
-            </a:r>
-            <a:r>
-              <a:rPr lang="en-US" sz="3800" dirty="0" smtClean="0">
-                <a:latin typeface="Arial" panose="020B0604020202020204" pitchFamily="34" charset="0"/>
-                <a:cs typeface="Arial" panose="020B0604020202020204" pitchFamily="34" charset="0"/>
-              </a:rPr>
-              <a:t>We ran several solutions and compared them to each other, as shown in the table to the left</a:t>
-            </a:r>
-            <a:r>
-              <a:rPr lang="en-US" sz="3800" dirty="0" smtClean="0">
-                <a:latin typeface="Arial" panose="020B0604020202020204" pitchFamily="34" charset="0"/>
-                <a:cs typeface="Arial" panose="020B0604020202020204" pitchFamily="34" charset="0"/>
-              </a:rPr>
-              <a:t>.</a:t>
+              <a:t>     We were provided a cost calculator that determined the total cost accumulated through by all of the test flights that we found paths for. We ran several solutions and compared them to each other, as shown in the table to the left.</a:t>
             </a:r>
           </a:p>
           <a:p>
@@ -5427,10 +5219,452 @@
           </a:p>
         </p:txBody>
       </p:sp>
+      <p:sp>
+        <p:nvSpPr>
+          <p:cNvPr id="20" name="TextBox 19"/>
+          <p:cNvSpPr txBox="1"/>
+          <p:nvPr/>
+        </p:nvSpPr>
+        <p:spPr>
+          <a:xfrm>
+            <a:off x="914400" y="8958005"/>
+            <a:ext cx="13304837" cy="16096714"/>
+          </a:xfrm>
+          <a:prstGeom prst="rect">
+            <a:avLst/>
+          </a:prstGeom>
+          <a:noFill/>
+        </p:spPr>
+        <p:txBody>
+          <a:bodyPr wrap="square" rtlCol="0">
+            <a:spAutoFit/>
+          </a:bodyPr>
+          <a:lstStyle/>
+          <a:p>
+            <a:r>
+              <a:rPr lang="en-US" sz="4000" dirty="0" smtClean="0">
+                <a:latin typeface="Arial" panose="020B0604020202020204" pitchFamily="34" charset="0"/>
+                <a:cs typeface="Arial" panose="020B0604020202020204" pitchFamily="34" charset="0"/>
+              </a:rPr>
+              <a:t>     </a:t>
+            </a:r>
+            <a:r>
+              <a:rPr lang="en-US" sz="4000" dirty="0" smtClean="0">
+                <a:latin typeface="Arial" panose="020B0604020202020204" pitchFamily="34" charset="0"/>
+                <a:cs typeface="Arial" panose="020B0604020202020204" pitchFamily="34" charset="0"/>
+              </a:rPr>
+              <a:t>In </a:t>
+            </a:r>
+            <a:r>
+              <a:rPr lang="en-US" sz="4000" dirty="0" smtClean="0">
+                <a:latin typeface="Arial" panose="020B0604020202020204" pitchFamily="34" charset="0"/>
+                <a:cs typeface="Arial" panose="020B0604020202020204" pitchFamily="34" charset="0"/>
+              </a:rPr>
+              <a:t>the modern day, airplanes are a frequently-used means of transportation. However, using it is fairly expensive to manage due to costs of fuel and delay. Due to many different factors, such as weather, restricted areas, and jet streams, it’s very difficult to keep this cost of such transportation at an optimal level; airports are always looking for more ways to optimize their flights. What we aim to do here in Flight Quest is to optimize to the best of our ability the costs of airplane flights using machine learning techniques on large sets of data.</a:t>
+            </a:r>
+          </a:p>
+          <a:p>
+            <a:r>
+              <a:rPr lang="en-US" sz="4000" dirty="0" smtClean="0">
+                <a:latin typeface="Arial" panose="020B0604020202020204" pitchFamily="34" charset="0"/>
+                <a:cs typeface="Arial" panose="020B0604020202020204" pitchFamily="34" charset="0"/>
+              </a:rPr>
+              <a:t>     </a:t>
+            </a:r>
+          </a:p>
+          <a:p>
+            <a:r>
+              <a:rPr lang="en-US" sz="4000" dirty="0">
+                <a:latin typeface="Arial" panose="020B0604020202020204" pitchFamily="34" charset="0"/>
+                <a:cs typeface="Arial" panose="020B0604020202020204" pitchFamily="34" charset="0"/>
+              </a:rPr>
+              <a:t> </a:t>
+            </a:r>
+            <a:r>
+              <a:rPr lang="en-US" sz="4000" dirty="0" smtClean="0">
+                <a:latin typeface="Arial" panose="020B0604020202020204" pitchFamily="34" charset="0"/>
+                <a:cs typeface="Arial" panose="020B0604020202020204" pitchFamily="34" charset="0"/>
+              </a:rPr>
+              <a:t>    Our task consists of using data obtained from previous flights to try and find optimal paths and conditions (e.g. speed, altitude) for new flights to take. However, since we don’t know exactly what features would be useful to train on, our data set contains many different attributes, making it very large and time-expensive to work with.</a:t>
+            </a:r>
+            <a:endParaRPr lang="en-US" sz="4000" dirty="0">
+              <a:latin typeface="Arial" panose="020B0604020202020204" pitchFamily="34" charset="0"/>
+              <a:cs typeface="Arial" panose="020B0604020202020204" pitchFamily="34" charset="0"/>
+            </a:endParaRPr>
+          </a:p>
+          <a:p>
+            <a:endParaRPr lang="en-US" sz="4000" dirty="0" smtClean="0">
+              <a:latin typeface="Arial" panose="020B0604020202020204" pitchFamily="34" charset="0"/>
+              <a:cs typeface="Arial" panose="020B0604020202020204" pitchFamily="34" charset="0"/>
+            </a:endParaRPr>
+          </a:p>
+          <a:p>
+            <a:r>
+              <a:rPr lang="en-US" sz="4000" dirty="0">
+                <a:latin typeface="Arial" panose="020B0604020202020204" pitchFamily="34" charset="0"/>
+                <a:cs typeface="Arial" panose="020B0604020202020204" pitchFamily="34" charset="0"/>
+              </a:rPr>
+              <a:t> </a:t>
+            </a:r>
+            <a:r>
+              <a:rPr lang="en-US" sz="4000" dirty="0" smtClean="0">
+                <a:latin typeface="Arial" panose="020B0604020202020204" pitchFamily="34" charset="0"/>
+                <a:cs typeface="Arial" panose="020B0604020202020204" pitchFamily="34" charset="0"/>
+              </a:rPr>
+              <a:t>    Our motivation for undertaking this task came from searching for something that would challenge us to use what we learned in innovative ways, </a:t>
+            </a:r>
+            <a:r>
+              <a:rPr lang="en-US" sz="4000" dirty="0" smtClean="0">
+                <a:latin typeface="Arial" panose="020B0604020202020204" pitchFamily="34" charset="0"/>
+                <a:cs typeface="Arial" panose="020B0604020202020204" pitchFamily="34" charset="0"/>
+              </a:rPr>
+              <a:t>give </a:t>
+            </a:r>
+            <a:r>
+              <a:rPr lang="en-US" sz="4000" dirty="0" smtClean="0">
+                <a:latin typeface="Arial" panose="020B0604020202020204" pitchFamily="34" charset="0"/>
+                <a:cs typeface="Arial" panose="020B0604020202020204" pitchFamily="34" charset="0"/>
+              </a:rPr>
+              <a:t>us experience with working on a real-life machine learning problem, and </a:t>
+            </a:r>
+            <a:r>
+              <a:rPr lang="en-US" sz="4000" dirty="0" smtClean="0">
+                <a:latin typeface="Arial" panose="020B0604020202020204" pitchFamily="34" charset="0"/>
+                <a:cs typeface="Arial" panose="020B0604020202020204" pitchFamily="34" charset="0"/>
+              </a:rPr>
+              <a:t>have </a:t>
+            </a:r>
+            <a:r>
+              <a:rPr lang="en-US" sz="4000" dirty="0" smtClean="0">
+                <a:latin typeface="Arial" panose="020B0604020202020204" pitchFamily="34" charset="0"/>
+                <a:cs typeface="Arial" panose="020B0604020202020204" pitchFamily="34" charset="0"/>
+              </a:rPr>
+              <a:t>an impact on people’s lives. The Flight Quest problem satiates these desires by starting us off at the beginning, giving us a goal, and then telling us to go about solving this problem however we deem necessary.</a:t>
+            </a:r>
+            <a:endParaRPr lang="en-US" sz="4000" dirty="0">
+              <a:latin typeface="Arial" panose="020B0604020202020204" pitchFamily="34" charset="0"/>
+              <a:cs typeface="Arial" panose="020B0604020202020204" pitchFamily="34" charset="0"/>
+            </a:endParaRPr>
+          </a:p>
+        </p:txBody>
+      </p:sp>
+      <p:sp>
+        <p:nvSpPr>
+          <p:cNvPr id="21" name="TextBox 20"/>
+          <p:cNvSpPr txBox="1"/>
+          <p:nvPr/>
+        </p:nvSpPr>
+        <p:spPr>
+          <a:xfrm>
+            <a:off x="16048037" y="8940145"/>
+            <a:ext cx="13304837" cy="16096714"/>
+          </a:xfrm>
+          <a:prstGeom prst="rect">
+            <a:avLst/>
+          </a:prstGeom>
+          <a:noFill/>
+        </p:spPr>
+        <p:txBody>
+          <a:bodyPr wrap="square" rtlCol="0">
+            <a:spAutoFit/>
+          </a:bodyPr>
+          <a:lstStyle/>
+          <a:p>
+            <a:r>
+              <a:rPr lang="en-US" sz="4000" dirty="0" smtClean="0">
+                <a:latin typeface="Arial" panose="020B0604020202020204" pitchFamily="34" charset="0"/>
+                <a:cs typeface="Arial" panose="020B0604020202020204" pitchFamily="34" charset="0"/>
+              </a:rPr>
+              <a:t>     First, we created a baseline measure that took the most direct distance in between the current and destination points (via great circle calculation) and made that the desired path. Paths are problematic because of their complex structure so we needed a way to reduce down the data. </a:t>
+            </a:r>
+          </a:p>
+          <a:p>
+            <a:endParaRPr lang="en-US" sz="4000" dirty="0">
+              <a:latin typeface="Arial" panose="020B0604020202020204" pitchFamily="34" charset="0"/>
+              <a:cs typeface="Arial" panose="020B0604020202020204" pitchFamily="34" charset="0"/>
+            </a:endParaRPr>
+          </a:p>
+          <a:p>
+            <a:r>
+              <a:rPr lang="en-US" sz="4000" dirty="0" smtClean="0">
+                <a:latin typeface="Arial" panose="020B0604020202020204" pitchFamily="34" charset="0"/>
+                <a:cs typeface="Arial" panose="020B0604020202020204" pitchFamily="34" charset="0"/>
+              </a:rPr>
+              <a:t>	Our next step was to identify and work </a:t>
+            </a:r>
+            <a:r>
+              <a:rPr lang="en-US" sz="4000" dirty="0" smtClean="0">
+                <a:latin typeface="Arial" panose="020B0604020202020204" pitchFamily="34" charset="0"/>
+                <a:cs typeface="Arial" panose="020B0604020202020204" pitchFamily="34" charset="0"/>
+              </a:rPr>
+              <a:t>	out </a:t>
+            </a:r>
+            <a:r>
+              <a:rPr lang="en-US" sz="4000" dirty="0" smtClean="0">
+                <a:latin typeface="Arial" panose="020B0604020202020204" pitchFamily="34" charset="0"/>
+                <a:cs typeface="Arial" panose="020B0604020202020204" pitchFamily="34" charset="0"/>
+              </a:rPr>
+              <a:t>a </a:t>
+            </a:r>
+            <a:r>
+              <a:rPr lang="en-US" sz="4000" dirty="0" smtClean="0">
+                <a:latin typeface="Arial" panose="020B0604020202020204" pitchFamily="34" charset="0"/>
+                <a:cs typeface="Arial" panose="020B0604020202020204" pitchFamily="34" charset="0"/>
+              </a:rPr>
+              <a:t>path </a:t>
+            </a:r>
+            <a:r>
+              <a:rPr lang="en-US" sz="4000" dirty="0" smtClean="0">
+                <a:latin typeface="Arial" panose="020B0604020202020204" pitchFamily="34" charset="0"/>
+                <a:cs typeface="Arial" panose="020B0604020202020204" pitchFamily="34" charset="0"/>
+              </a:rPr>
+              <a:t>around restricted areas, </a:t>
+            </a:r>
+            <a:r>
+              <a:rPr lang="en-US" sz="4000" dirty="0" smtClean="0">
+                <a:latin typeface="Arial" panose="020B0604020202020204" pitchFamily="34" charset="0"/>
+                <a:cs typeface="Arial" panose="020B0604020202020204" pitchFamily="34" charset="0"/>
+              </a:rPr>
+              <a:t>	since </a:t>
+            </a:r>
+            <a:r>
+              <a:rPr lang="en-US" sz="4000" dirty="0" smtClean="0">
+                <a:latin typeface="Arial" panose="020B0604020202020204" pitchFamily="34" charset="0"/>
+                <a:cs typeface="Arial" panose="020B0604020202020204" pitchFamily="34" charset="0"/>
+              </a:rPr>
+              <a:t>no flights </a:t>
+            </a:r>
+            <a:r>
+              <a:rPr lang="en-US" sz="4000" dirty="0" smtClean="0">
+                <a:latin typeface="Arial" panose="020B0604020202020204" pitchFamily="34" charset="0"/>
+                <a:cs typeface="Arial" panose="020B0604020202020204" pitchFamily="34" charset="0"/>
+              </a:rPr>
+              <a:t>are allowed through 	these. </a:t>
+            </a:r>
+            <a:r>
+              <a:rPr lang="en-US" sz="4000" dirty="0" smtClean="0">
+                <a:latin typeface="Arial" panose="020B0604020202020204" pitchFamily="34" charset="0"/>
+                <a:cs typeface="Arial" panose="020B0604020202020204" pitchFamily="34" charset="0"/>
+              </a:rPr>
+              <a:t>In order to account for </a:t>
+            </a:r>
+            <a:r>
+              <a:rPr lang="en-US" sz="4000" dirty="0" smtClean="0">
+                <a:latin typeface="Arial" panose="020B0604020202020204" pitchFamily="34" charset="0"/>
+                <a:cs typeface="Arial" panose="020B0604020202020204" pitchFamily="34" charset="0"/>
+              </a:rPr>
+              <a:t>this</a:t>
+            </a:r>
+            <a:r>
+              <a:rPr lang="en-US" sz="4000" dirty="0" smtClean="0">
+                <a:latin typeface="Arial" panose="020B0604020202020204" pitchFamily="34" charset="0"/>
+                <a:cs typeface="Arial" panose="020B0604020202020204" pitchFamily="34" charset="0"/>
+              </a:rPr>
+              <a:t>, </a:t>
+            </a:r>
+            <a:r>
+              <a:rPr lang="en-US" sz="4000" dirty="0" smtClean="0">
+                <a:latin typeface="Arial" panose="020B0604020202020204" pitchFamily="34" charset="0"/>
+                <a:cs typeface="Arial" panose="020B0604020202020204" pitchFamily="34" charset="0"/>
+              </a:rPr>
+              <a:t>we 	consider </a:t>
+            </a:r>
+            <a:r>
+              <a:rPr lang="en-US" sz="4000" dirty="0" smtClean="0">
+                <a:latin typeface="Arial" panose="020B0604020202020204" pitchFamily="34" charset="0"/>
+                <a:cs typeface="Arial" panose="020B0604020202020204" pitchFamily="34" charset="0"/>
+              </a:rPr>
+              <a:t>numerous points in </a:t>
+            </a:r>
+            <a:r>
+              <a:rPr lang="en-US" sz="4000" dirty="0" smtClean="0">
+                <a:latin typeface="Arial" panose="020B0604020202020204" pitchFamily="34" charset="0"/>
+                <a:cs typeface="Arial" panose="020B0604020202020204" pitchFamily="34" charset="0"/>
+              </a:rPr>
+              <a:t>between 	our </a:t>
+            </a:r>
+            <a:r>
+              <a:rPr lang="en-US" sz="4000" dirty="0" smtClean="0">
+                <a:latin typeface="Arial" panose="020B0604020202020204" pitchFamily="34" charset="0"/>
+                <a:cs typeface="Arial" panose="020B0604020202020204" pitchFamily="34" charset="0"/>
+              </a:rPr>
+              <a:t>current and destination </a:t>
+            </a:r>
+            <a:r>
+              <a:rPr lang="en-US" sz="4000" dirty="0" smtClean="0">
+                <a:latin typeface="Arial" panose="020B0604020202020204" pitchFamily="34" charset="0"/>
+                <a:cs typeface="Arial" panose="020B0604020202020204" pitchFamily="34" charset="0"/>
+              </a:rPr>
+              <a:t>locations 	and then </a:t>
+            </a:r>
+            <a:r>
+              <a:rPr lang="en-US" sz="4000" dirty="0" smtClean="0">
+                <a:latin typeface="Arial" panose="020B0604020202020204" pitchFamily="34" charset="0"/>
+                <a:cs typeface="Arial" panose="020B0604020202020204" pitchFamily="34" charset="0"/>
+              </a:rPr>
+              <a:t>attempt to </a:t>
+            </a:r>
+            <a:r>
+              <a:rPr lang="en-US" sz="4000" dirty="0" smtClean="0">
+                <a:latin typeface="Arial" panose="020B0604020202020204" pitchFamily="34" charset="0"/>
+                <a:cs typeface="Arial" panose="020B0604020202020204" pitchFamily="34" charset="0"/>
+              </a:rPr>
+              <a:t>construct a </a:t>
+            </a:r>
+            <a:r>
+              <a:rPr lang="en-US" sz="4000" dirty="0" smtClean="0">
+                <a:latin typeface="Arial" panose="020B0604020202020204" pitchFamily="34" charset="0"/>
+                <a:cs typeface="Arial" panose="020B0604020202020204" pitchFamily="34" charset="0"/>
+              </a:rPr>
+              <a:t>path </a:t>
+            </a:r>
+            <a:r>
+              <a:rPr lang="en-US" sz="4000" dirty="0" smtClean="0">
+                <a:latin typeface="Arial" panose="020B0604020202020204" pitchFamily="34" charset="0"/>
+                <a:cs typeface="Arial" panose="020B0604020202020204" pitchFamily="34" charset="0"/>
+              </a:rPr>
+              <a:t>	going through </a:t>
+            </a:r>
+            <a:r>
+              <a:rPr lang="en-US" sz="4000" dirty="0" smtClean="0">
+                <a:latin typeface="Arial" panose="020B0604020202020204" pitchFamily="34" charset="0"/>
+                <a:cs typeface="Arial" panose="020B0604020202020204" pitchFamily="34" charset="0"/>
+              </a:rPr>
+              <a:t>points that don’t </a:t>
+            </a:r>
+            <a:r>
+              <a:rPr lang="en-US" sz="4000" dirty="0" smtClean="0">
+                <a:latin typeface="Arial" panose="020B0604020202020204" pitchFamily="34" charset="0"/>
+                <a:cs typeface="Arial" panose="020B0604020202020204" pitchFamily="34" charset="0"/>
+              </a:rPr>
+              <a:t>lie </a:t>
+            </a:r>
+            <a:r>
+              <a:rPr lang="en-US" sz="4000" dirty="0" smtClean="0">
+                <a:latin typeface="Arial" panose="020B0604020202020204" pitchFamily="34" charset="0"/>
+                <a:cs typeface="Arial" panose="020B0604020202020204" pitchFamily="34" charset="0"/>
+              </a:rPr>
+              <a:t>in </a:t>
+            </a:r>
+            <a:r>
+              <a:rPr lang="en-US" sz="4000" dirty="0" smtClean="0">
+                <a:latin typeface="Arial" panose="020B0604020202020204" pitchFamily="34" charset="0"/>
+                <a:cs typeface="Arial" panose="020B0604020202020204" pitchFamily="34" charset="0"/>
+              </a:rPr>
+              <a:t>	restricted areas </a:t>
+            </a:r>
+            <a:r>
+              <a:rPr lang="en-US" sz="4000" dirty="0" smtClean="0">
+                <a:latin typeface="Arial" panose="020B0604020202020204" pitchFamily="34" charset="0"/>
+                <a:cs typeface="Arial" panose="020B0604020202020204" pitchFamily="34" charset="0"/>
+              </a:rPr>
+              <a:t>using an A* </a:t>
+            </a:r>
+            <a:r>
+              <a:rPr lang="en-US" sz="4000" dirty="0" smtClean="0">
+                <a:latin typeface="Arial" panose="020B0604020202020204" pitchFamily="34" charset="0"/>
+                <a:cs typeface="Arial" panose="020B0604020202020204" pitchFamily="34" charset="0"/>
+              </a:rPr>
+              <a:t>search.</a:t>
+            </a:r>
+            <a:endParaRPr lang="en-US" sz="4000" dirty="0" smtClean="0">
+              <a:latin typeface="Arial" panose="020B0604020202020204" pitchFamily="34" charset="0"/>
+              <a:cs typeface="Arial" panose="020B0604020202020204" pitchFamily="34" charset="0"/>
+            </a:endParaRPr>
+          </a:p>
+          <a:p>
+            <a:endParaRPr lang="en-US" sz="4000" dirty="0">
+              <a:latin typeface="Arial" panose="020B0604020202020204" pitchFamily="34" charset="0"/>
+              <a:cs typeface="Arial" panose="020B0604020202020204" pitchFamily="34" charset="0"/>
+            </a:endParaRPr>
+          </a:p>
+          <a:p>
+            <a:r>
+              <a:rPr lang="en-US" sz="4000" dirty="0" smtClean="0">
+                <a:latin typeface="Arial" panose="020B0604020202020204" pitchFamily="34" charset="0"/>
+                <a:cs typeface="Arial" panose="020B0604020202020204" pitchFamily="34" charset="0"/>
+              </a:rPr>
+              <a:t>     Afterwards, we focused on finding optimal </a:t>
+            </a:r>
+            <a:r>
+              <a:rPr lang="en-US" sz="4000" dirty="0" smtClean="0">
+                <a:latin typeface="Arial" panose="020B0604020202020204" pitchFamily="34" charset="0"/>
+                <a:cs typeface="Arial" panose="020B0604020202020204" pitchFamily="34" charset="0"/>
+              </a:rPr>
+              <a:t>speeds, altitudes, and descent patterns </a:t>
+            </a:r>
+            <a:r>
+              <a:rPr lang="en-US" sz="4000" dirty="0" smtClean="0">
+                <a:latin typeface="Arial" panose="020B0604020202020204" pitchFamily="34" charset="0"/>
+                <a:cs typeface="Arial" panose="020B0604020202020204" pitchFamily="34" charset="0"/>
+              </a:rPr>
+              <a:t>for segments of our new generated flight path in order to find the best balance between fuel consumption and arrival time. In order to do this, we would need to first find the features that would be significant enough to train on and then train our data using a model. Another challenge would be finding out which learning algorithms would be appropriate.</a:t>
+            </a:r>
+            <a:endParaRPr lang="en-US" sz="4000" dirty="0">
+              <a:latin typeface="Arial" panose="020B0604020202020204" pitchFamily="34" charset="0"/>
+              <a:cs typeface="Arial" panose="020B0604020202020204" pitchFamily="34" charset="0"/>
+            </a:endParaRPr>
+          </a:p>
+        </p:txBody>
+      </p:sp>
+      <p:pic>
+        <p:nvPicPr>
+          <p:cNvPr id="22" name="Picture 3"/>
+          <p:cNvPicPr>
+            <a:picLocks noChangeAspect="1" noChangeArrowheads="1"/>
+          </p:cNvPicPr>
+          <p:nvPr/>
+        </p:nvPicPr>
+        <p:blipFill>
+          <a:blip r:embed="rId4">
+            <a:extLst>
+              <a:ext uri="{28A0092B-C50C-407E-A947-70E740481C1C}">
+                <a14:useLocalDpi xmlns:a14="http://schemas.microsoft.com/office/drawing/2010/main" val="0"/>
+              </a:ext>
+            </a:extLst>
+          </a:blip>
+          <a:srcRect/>
+          <a:stretch>
+            <a:fillRect/>
+          </a:stretch>
+        </p:blipFill>
+        <p:spPr bwMode="auto">
+          <a:xfrm>
+            <a:off x="16162337" y="13243719"/>
+            <a:ext cx="4009271" cy="5486400"/>
+          </a:xfrm>
+          <a:prstGeom prst="rect">
+            <a:avLst/>
+          </a:prstGeom>
+          <a:noFill/>
+          <a:ln>
+            <a:noFill/>
+          </a:ln>
+          <a:extLst>
+            <a:ext uri="{909E8E84-426E-40DD-AFC4-6F175D3DCCD1}">
+              <a14:hiddenFill xmlns:a14="http://schemas.microsoft.com/office/drawing/2010/main">
+                <a:solidFill>
+                  <a:schemeClr val="accent1"/>
+                </a:solidFill>
+              </a14:hiddenFill>
+            </a:ext>
+            <a:ext uri="{91240B29-F687-4F45-9708-019B960494DF}">
+              <a14:hiddenLine xmlns:a14="http://schemas.microsoft.com/office/drawing/2010/main" w="9525">
+                <a:solidFill>
+                  <a:schemeClr val="tx1"/>
+                </a:solidFill>
+                <a:miter lim="800000"/>
+                <a:headEnd/>
+                <a:tailEnd/>
+              </a14:hiddenLine>
+            </a:ext>
+          </a:extLst>
+        </p:spPr>
+      </p:pic>
     </p:spTree>
     <p:extLst>
       <p:ext uri="{BB962C8B-B14F-4D97-AF65-F5344CB8AC3E}">
-        <p14:creationId xmlns:p14="http://schemas.microsoft.com/office/powerpoint/2010/main" xmlns="" val="178827332"/>
+        <p14:creationId xmlns:p14="http://schemas.microsoft.com/office/powerpoint/2010/main" val="178827332"/>
       </p:ext>
     </p:extLst>
   </p:cSld>

</xml_diff>